<commit_message>
improve the layout of ppt
</commit_message>
<xml_diff>
--- a/Pre-Final Pre/MusierPreFinal.pptx
+++ b/Pre-Final Pre/MusierPreFinal.pptx
@@ -705,7 +705,7 @@
           <a:bodyPr/>
           <a:lstStyle/>
           <a:p>
-            <a:endParaRPr lang="zh-CN" altLang="en-US"/>
+            <a:endParaRPr lang="zh-CN" altLang="en-US" dirty="0"/>
           </a:p>
         </p:txBody>
       </p:sp>
@@ -6232,10 +6232,10 @@
         </p:nvGrpSpPr>
         <p:grpSpPr>
           <a:xfrm>
-            <a:off x="647564" y="1110671"/>
-            <a:ext cx="7579872" cy="370144"/>
-            <a:chOff x="2500298" y="1357302"/>
-            <a:chExt cx="5643602" cy="423998"/>
+            <a:off x="647564" y="1138594"/>
+            <a:ext cx="7580067" cy="307778"/>
+            <a:chOff x="2500298" y="1389288"/>
+            <a:chExt cx="5643747" cy="352558"/>
           </a:xfrm>
         </p:grpSpPr>
         <p:sp>
@@ -6304,8 +6304,8 @@
           </p:nvSpPr>
           <p:spPr>
             <a:xfrm>
-              <a:off x="5357818" y="1357302"/>
-              <a:ext cx="2786082" cy="246790"/>
+              <a:off x="5357963" y="1406749"/>
+              <a:ext cx="2786082" cy="317301"/>
             </a:xfrm>
             <a:prstGeom prst="rect">
               <a:avLst/>
@@ -6318,42 +6318,42 @@
             <a:lstStyle/>
             <a:p>
               <a:r>
-                <a:rPr kumimoji="1" lang="en-US" altLang="zh-CN" sz="800" dirty="0"/>
+                <a:rPr kumimoji="1" lang="en-US" altLang="zh-CN" sz="1200" dirty="0"/>
                 <a:t>Different</a:t>
               </a:r>
               <a:r>
-                <a:rPr kumimoji="1" lang="zh-CN" altLang="en-US" sz="800" dirty="0"/>
+                <a:rPr kumimoji="1" lang="zh-CN" altLang="en-US" sz="1200" dirty="0"/>
                 <a:t> </a:t>
               </a:r>
               <a:r>
-                <a:rPr kumimoji="1" lang="en-US" altLang="zh-CN" sz="800" dirty="0"/>
+                <a:rPr kumimoji="1" lang="en-US" altLang="zh-CN" sz="1200" dirty="0"/>
                 <a:t>standard</a:t>
               </a:r>
               <a:r>
-                <a:rPr kumimoji="1" lang="zh-CN" altLang="en-US" sz="800" dirty="0"/>
+                <a:rPr kumimoji="1" lang="zh-CN" altLang="en-US" sz="1200" dirty="0"/>
                 <a:t> </a:t>
               </a:r>
               <a:r>
-                <a:rPr kumimoji="1" lang="en-US" altLang="zh-CN" sz="800" dirty="0"/>
+                <a:rPr kumimoji="1" lang="en-US" altLang="zh-CN" sz="1200" dirty="0"/>
                 <a:t>for</a:t>
               </a:r>
               <a:r>
-                <a:rPr kumimoji="1" lang="zh-CN" altLang="en-US" sz="800" dirty="0"/>
+                <a:rPr kumimoji="1" lang="zh-CN" altLang="en-US" sz="1200" dirty="0"/>
                 <a:t> </a:t>
               </a:r>
               <a:r>
-                <a:rPr kumimoji="1" lang="en-US" altLang="zh-CN" sz="800" dirty="0"/>
+                <a:rPr kumimoji="1" lang="en-US" altLang="zh-CN" sz="1200" dirty="0"/>
                 <a:t>music</a:t>
               </a:r>
               <a:r>
-                <a:rPr kumimoji="1" lang="zh-CN" altLang="en-US" sz="800" dirty="0"/>
+                <a:rPr kumimoji="1" lang="zh-CN" altLang="en-US" sz="1200" dirty="0"/>
                 <a:t> </a:t>
               </a:r>
               <a:r>
-                <a:rPr kumimoji="1" lang="en-US" altLang="zh-CN" sz="800" dirty="0"/>
+                <a:rPr kumimoji="1" lang="en-US" altLang="zh-CN" sz="1200" dirty="0"/>
                 <a:t>representation</a:t>
               </a:r>
-              <a:endParaRPr lang="en-US" sz="800" dirty="0">
+              <a:endParaRPr lang="en-US" sz="1200" dirty="0">
                 <a:solidFill>
                   <a:schemeClr val="bg1">
                     <a:lumMod val="65000"/>
@@ -6380,7 +6380,7 @@
           </p:nvSpPr>
           <p:spPr>
             <a:xfrm>
-              <a:off x="4071934" y="1428742"/>
+              <a:off x="4103153" y="1389288"/>
               <a:ext cx="693911" cy="352558"/>
             </a:xfrm>
             <a:prstGeom prst="rect">
@@ -6465,10 +6465,10 @@
         </p:nvGrpSpPr>
         <p:grpSpPr>
           <a:xfrm>
-            <a:off x="642806" y="1584618"/>
-            <a:ext cx="7579872" cy="307777"/>
-            <a:chOff x="2500298" y="2285998"/>
-            <a:chExt cx="5643602" cy="352558"/>
+            <a:off x="642806" y="1564624"/>
+            <a:ext cx="7584825" cy="307776"/>
+            <a:chOff x="2500298" y="2263096"/>
+            <a:chExt cx="5647290" cy="352557"/>
           </a:xfrm>
         </p:grpSpPr>
         <p:sp>
@@ -6492,7 +6492,9 @@
               <a:avLst/>
             </a:prstGeom>
             <a:solidFill>
-              <a:schemeClr val="accent2"/>
+              <a:schemeClr val="accent2">
+                <a:lumMod val="50000"/>
+              </a:schemeClr>
             </a:solidFill>
             <a:ln>
               <a:noFill/>
@@ -6580,8 +6582,8 @@
           </p:nvSpPr>
           <p:spPr>
             <a:xfrm>
-              <a:off x="5357818" y="2285998"/>
-              <a:ext cx="2786082" cy="246791"/>
+              <a:off x="5361506" y="2283389"/>
+              <a:ext cx="2786082" cy="317302"/>
             </a:xfrm>
             <a:prstGeom prst="rect">
               <a:avLst/>
@@ -6594,42 +6596,46 @@
             <a:lstStyle/>
             <a:p>
               <a:r>
-                <a:rPr kumimoji="1" lang="en-US" altLang="zh-CN" sz="800" dirty="0"/>
+                <a:rPr kumimoji="1" lang="en-US" altLang="zh-CN" sz="1200" dirty="0"/>
                 <a:t>Using</a:t>
               </a:r>
               <a:r>
-                <a:rPr kumimoji="1" lang="zh-CN" altLang="en-US" sz="800" dirty="0"/>
+                <a:rPr kumimoji="1" lang="zh-CN" altLang="en-US" sz="1200" dirty="0"/>
                 <a:t> </a:t>
               </a:r>
               <a:r>
-                <a:rPr kumimoji="1" lang="en-US" altLang="zh-CN" sz="800" dirty="0" err="1"/>
-                <a:t>abcnotion</a:t>
-              </a:r>
-              <a:r>
-                <a:rPr kumimoji="1" lang="zh-CN" altLang="en-US" sz="800" dirty="0"/>
+                <a:rPr kumimoji="1" lang="en-US" altLang="zh-CN" sz="1200" dirty="0" err="1" smtClean="0"/>
+                <a:t>abc</a:t>
+              </a:r>
+              <a:r>
+                <a:rPr kumimoji="1" lang="en-US" altLang="zh-CN" sz="1200" dirty="0" smtClean="0"/>
+                <a:t> notion</a:t>
+              </a:r>
+              <a:r>
+                <a:rPr kumimoji="1" lang="zh-CN" altLang="en-US" sz="1200" dirty="0" smtClean="0"/>
                 <a:t> </a:t>
               </a:r>
               <a:r>
-                <a:rPr kumimoji="1" lang="en-US" altLang="zh-CN" sz="800" dirty="0"/>
+                <a:rPr kumimoji="1" lang="en-US" altLang="zh-CN" sz="1200" dirty="0"/>
                 <a:t>standard</a:t>
               </a:r>
               <a:r>
-                <a:rPr kumimoji="1" lang="zh-CN" altLang="en-US" sz="800" dirty="0"/>
+                <a:rPr kumimoji="1" lang="zh-CN" altLang="en-US" sz="1200" dirty="0"/>
                 <a:t> </a:t>
               </a:r>
               <a:r>
-                <a:rPr kumimoji="1" lang="en-US" altLang="zh-CN" sz="800" dirty="0"/>
+                <a:rPr kumimoji="1" lang="en-US" altLang="zh-CN" sz="1200" dirty="0"/>
                 <a:t>as</a:t>
               </a:r>
               <a:r>
-                <a:rPr kumimoji="1" lang="zh-CN" altLang="en-US" sz="800" dirty="0"/>
+                <a:rPr kumimoji="1" lang="zh-CN" altLang="en-US" sz="1200" dirty="0"/>
                 <a:t> </a:t>
               </a:r>
               <a:r>
-                <a:rPr kumimoji="1" lang="en-US" altLang="zh-CN" sz="800" dirty="0"/>
+                <a:rPr kumimoji="1" lang="en-US" altLang="zh-CN" sz="1200" dirty="0"/>
                 <a:t>interface</a:t>
               </a:r>
-              <a:endParaRPr lang="en-US" sz="800" dirty="0">
+              <a:endParaRPr lang="en-US" sz="1200" dirty="0">
                 <a:solidFill>
                   <a:schemeClr val="bg1">
                     <a:lumMod val="65000"/>
@@ -6656,8 +6662,8 @@
           </p:nvSpPr>
           <p:spPr>
             <a:xfrm>
-              <a:off x="4071934" y="2285998"/>
-              <a:ext cx="685318" cy="352558"/>
+              <a:off x="4118147" y="2263096"/>
+              <a:ext cx="685318" cy="352557"/>
             </a:xfrm>
             <a:prstGeom prst="rect">
               <a:avLst/>
@@ -6698,10 +6704,10 @@
         </p:nvGrpSpPr>
         <p:grpSpPr>
           <a:xfrm>
-            <a:off x="642806" y="2048198"/>
-            <a:ext cx="7579872" cy="370141"/>
-            <a:chOff x="2500298" y="1357304"/>
-            <a:chExt cx="5643602" cy="423996"/>
+            <a:off x="642806" y="2011699"/>
+            <a:ext cx="7673609" cy="461665"/>
+            <a:chOff x="2500298" y="1315494"/>
+            <a:chExt cx="5713394" cy="528836"/>
           </a:xfrm>
         </p:grpSpPr>
         <p:sp>
@@ -6770,8 +6776,8 @@
           </p:nvSpPr>
           <p:spPr>
             <a:xfrm>
-              <a:off x="5357818" y="1357304"/>
-              <a:ext cx="2786082" cy="246791"/>
+              <a:off x="5361505" y="1315494"/>
+              <a:ext cx="2852187" cy="528836"/>
             </a:xfrm>
             <a:prstGeom prst="rect">
               <a:avLst/>
@@ -6784,119 +6790,119 @@
             <a:lstStyle/>
             <a:p>
               <a:r>
-                <a:rPr kumimoji="1" lang="en-US" altLang="zh-CN" sz="800" dirty="0"/>
+                <a:rPr kumimoji="1" lang="en-US" altLang="zh-CN" sz="1200" dirty="0"/>
                 <a:t>For</a:t>
               </a:r>
               <a:r>
-                <a:rPr kumimoji="1" lang="zh-CN" altLang="en-US" sz="800" dirty="0"/>
+                <a:rPr kumimoji="1" lang="zh-CN" altLang="en-US" sz="1200" dirty="0"/>
                 <a:t> </a:t>
               </a:r>
               <a:r>
-                <a:rPr kumimoji="1" lang="en-US" altLang="zh-CN" sz="800" dirty="0"/>
+                <a:rPr kumimoji="1" lang="en-US" altLang="zh-CN" sz="1200" dirty="0"/>
                 <a:t>the</a:t>
               </a:r>
               <a:r>
-                <a:rPr kumimoji="1" lang="zh-CN" altLang="en-US" sz="800" dirty="0"/>
+                <a:rPr kumimoji="1" lang="zh-CN" altLang="en-US" sz="1200" dirty="0"/>
                 <a:t> </a:t>
               </a:r>
               <a:r>
-                <a:rPr kumimoji="1" lang="en-US" altLang="zh-CN" sz="800" dirty="0"/>
+                <a:rPr kumimoji="1" lang="en-US" altLang="zh-CN" sz="1200" dirty="0"/>
                 <a:t>property</a:t>
               </a:r>
               <a:r>
-                <a:rPr kumimoji="1" lang="zh-CN" altLang="en-US" sz="800" dirty="0"/>
+                <a:rPr kumimoji="1" lang="zh-CN" altLang="en-US" sz="1200" dirty="0"/>
                 <a:t> </a:t>
               </a:r>
               <a:r>
-                <a:rPr kumimoji="1" lang="en-US" altLang="zh-CN" sz="800" dirty="0"/>
+                <a:rPr kumimoji="1" lang="en-US" altLang="zh-CN" sz="1200" dirty="0"/>
                 <a:t>of</a:t>
               </a:r>
               <a:r>
-                <a:rPr kumimoji="1" lang="zh-CN" altLang="en-US" sz="800" dirty="0"/>
+                <a:rPr kumimoji="1" lang="zh-CN" altLang="en-US" sz="1200" dirty="0"/>
                 <a:t> </a:t>
               </a:r>
               <a:r>
-                <a:rPr kumimoji="1" lang="en-US" altLang="zh-CN" sz="800" dirty="0"/>
-                <a:t>GA</a:t>
-              </a:r>
-              <a:r>
-                <a:rPr kumimoji="1" lang="zh-CN" altLang="en-US" sz="800" dirty="0"/>
+                <a:rPr kumimoji="1" lang="en-US" altLang="zh-CN" sz="1200" dirty="0"/>
+                <a:t>genetic algorithm</a:t>
+              </a:r>
+              <a:r>
+                <a:rPr kumimoji="1" lang="zh-CN" altLang="en-US" sz="1200" dirty="0" smtClean="0"/>
                 <a:t> </a:t>
               </a:r>
               <a:r>
-                <a:rPr kumimoji="1" lang="en-US" altLang="zh-CN" sz="800" dirty="0"/>
+                <a:rPr kumimoji="1" lang="en-US" altLang="zh-CN" sz="1200" dirty="0"/>
                 <a:t>model,</a:t>
               </a:r>
               <a:r>
-                <a:rPr kumimoji="1" lang="zh-CN" altLang="en-US" sz="800" dirty="0"/>
+                <a:rPr kumimoji="1" lang="zh-CN" altLang="en-US" sz="1200" dirty="0"/>
                 <a:t> </a:t>
               </a:r>
               <a:r>
-                <a:rPr kumimoji="1" lang="en-US" altLang="zh-CN" sz="800" dirty="0"/>
+                <a:rPr kumimoji="1" lang="en-US" altLang="zh-CN" sz="1200" dirty="0"/>
                 <a:t>last</a:t>
               </a:r>
               <a:r>
-                <a:rPr kumimoji="1" lang="zh-CN" altLang="en-US" sz="800" dirty="0"/>
+                <a:rPr kumimoji="1" lang="zh-CN" altLang="en-US" sz="1200" dirty="0"/>
                 <a:t> </a:t>
               </a:r>
               <a:r>
-                <a:rPr kumimoji="1" lang="en-US" altLang="zh-CN" sz="800" dirty="0"/>
+                <a:rPr kumimoji="1" lang="en-US" altLang="zh-CN" sz="1200" dirty="0"/>
                 <a:t>bar</a:t>
               </a:r>
               <a:r>
-                <a:rPr kumimoji="1" lang="zh-CN" altLang="en-US" sz="800" dirty="0"/>
+                <a:rPr kumimoji="1" lang="zh-CN" altLang="en-US" sz="1200" dirty="0"/>
                 <a:t> </a:t>
               </a:r>
               <a:r>
-                <a:rPr kumimoji="1" lang="en-US" altLang="zh-CN" sz="800" dirty="0"/>
+                <a:rPr kumimoji="1" lang="en-US" altLang="zh-CN" sz="1200" dirty="0"/>
                 <a:t>ends</a:t>
               </a:r>
               <a:r>
-                <a:rPr kumimoji="1" lang="zh-CN" altLang="en-US" sz="800" dirty="0"/>
+                <a:rPr kumimoji="1" lang="zh-CN" altLang="en-US" sz="1200" dirty="0"/>
                 <a:t> </a:t>
               </a:r>
               <a:r>
-                <a:rPr kumimoji="1" lang="en-US" altLang="zh-CN" sz="800" dirty="0"/>
+                <a:rPr kumimoji="1" lang="en-US" altLang="zh-CN" sz="1200" dirty="0"/>
                 <a:t>in</a:t>
               </a:r>
               <a:r>
-                <a:rPr kumimoji="1" lang="zh-CN" altLang="en-US" sz="800" dirty="0"/>
+                <a:rPr kumimoji="1" lang="zh-CN" altLang="en-US" sz="1200" dirty="0"/>
                 <a:t> </a:t>
               </a:r>
               <a:r>
-                <a:rPr kumimoji="1" lang="en-US" altLang="zh-CN" sz="800" dirty="0"/>
+                <a:rPr kumimoji="1" lang="en-US" altLang="zh-CN" sz="1200" dirty="0"/>
                 <a:t>established</a:t>
               </a:r>
               <a:r>
-                <a:rPr kumimoji="1" lang="zh-CN" altLang="en-US" sz="800" dirty="0"/>
+                <a:rPr kumimoji="1" lang="zh-CN" altLang="en-US" sz="1200" dirty="0"/>
                 <a:t> </a:t>
               </a:r>
               <a:r>
-                <a:rPr kumimoji="1" lang="en-US" altLang="zh-CN" sz="800" dirty="0"/>
+                <a:rPr kumimoji="1" lang="en-US" altLang="zh-CN" sz="1200" dirty="0"/>
                 <a:t>note</a:t>
               </a:r>
               <a:r>
-                <a:rPr kumimoji="1" lang="zh-CN" altLang="en-US" sz="800" dirty="0"/>
+                <a:rPr kumimoji="1" lang="zh-CN" altLang="en-US" sz="1200" dirty="0"/>
                 <a:t> </a:t>
               </a:r>
               <a:r>
-                <a:rPr kumimoji="1" lang="en-US" altLang="zh-CN" sz="800" dirty="0"/>
+                <a:rPr kumimoji="1" lang="en-US" altLang="zh-CN" sz="1200" dirty="0"/>
                 <a:t>is</a:t>
               </a:r>
               <a:r>
-                <a:rPr kumimoji="1" lang="zh-CN" altLang="en-US" sz="800" dirty="0"/>
+                <a:rPr kumimoji="1" lang="zh-CN" altLang="en-US" sz="1200" dirty="0"/>
                 <a:t> </a:t>
               </a:r>
               <a:r>
-                <a:rPr kumimoji="1" lang="en-US" altLang="zh-CN" sz="800" dirty="0"/>
+                <a:rPr kumimoji="1" lang="en-US" altLang="zh-CN" sz="1200" dirty="0"/>
                 <a:t>not</a:t>
               </a:r>
               <a:r>
-                <a:rPr kumimoji="1" lang="zh-CN" altLang="en-US" sz="800" dirty="0"/>
+                <a:rPr kumimoji="1" lang="zh-CN" altLang="en-US" sz="1200" dirty="0"/>
                 <a:t> </a:t>
               </a:r>
               <a:r>
-                <a:rPr kumimoji="1" lang="en-US" altLang="zh-CN" sz="800" dirty="0"/>
+                <a:rPr kumimoji="1" lang="en-US" altLang="zh-CN" sz="1200" dirty="0"/>
                 <a:t>guaranteed.</a:t>
               </a:r>
             </a:p>
@@ -6916,7 +6922,7 @@
           </p:nvSpPr>
           <p:spPr>
             <a:xfrm>
-              <a:off x="4071934" y="1428742"/>
+              <a:off x="4121670" y="1393430"/>
               <a:ext cx="693911" cy="352558"/>
             </a:xfrm>
             <a:prstGeom prst="rect">
@@ -7001,10 +7007,10 @@
         </p:nvGrpSpPr>
         <p:grpSpPr>
           <a:xfrm>
-            <a:off x="638048" y="2522147"/>
-            <a:ext cx="7579872" cy="307777"/>
-            <a:chOff x="2500298" y="2285998"/>
-            <a:chExt cx="5643602" cy="352558"/>
+            <a:off x="638048" y="2501886"/>
+            <a:ext cx="7589583" cy="307777"/>
+            <a:chOff x="2500298" y="2262789"/>
+            <a:chExt cx="5650832" cy="352558"/>
           </a:xfrm>
         </p:grpSpPr>
         <p:sp>
@@ -7028,7 +7034,9 @@
               <a:avLst/>
             </a:prstGeom>
             <a:solidFill>
-              <a:schemeClr val="accent2"/>
+              <a:schemeClr val="accent2">
+                <a:lumMod val="50000"/>
+              </a:schemeClr>
             </a:solidFill>
             <a:ln>
               <a:noFill/>
@@ -7055,7 +7063,13 @@
             <a:lstStyle/>
             <a:p>
               <a:pPr algn="ctr"/>
-              <a:endParaRPr lang="en-US"/>
+              <a:endParaRPr lang="en-US">
+                <a:solidFill>
+                  <a:schemeClr val="accent4">
+                    <a:lumMod val="50000"/>
+                  </a:schemeClr>
+                </a:solidFill>
+              </a:endParaRPr>
             </a:p>
           </p:txBody>
         </p:sp>
@@ -7116,8 +7130,8 @@
           </p:nvSpPr>
           <p:spPr>
             <a:xfrm>
-              <a:off x="5357818" y="2285998"/>
-              <a:ext cx="2786082" cy="246790"/>
+              <a:off x="5365048" y="2284430"/>
+              <a:ext cx="2786082" cy="317302"/>
             </a:xfrm>
             <a:prstGeom prst="rect">
               <a:avLst/>
@@ -7130,50 +7144,50 @@
             <a:lstStyle/>
             <a:p>
               <a:r>
-                <a:rPr kumimoji="1" lang="en-US" altLang="zh-CN" sz="800" dirty="0"/>
+                <a:rPr kumimoji="1" lang="en-US" altLang="zh-CN" sz="1200" dirty="0"/>
                 <a:t>A</a:t>
               </a:r>
               <a:r>
-                <a:rPr kumimoji="1" lang="zh-CN" altLang="en-US" sz="800" dirty="0"/>
+                <a:rPr kumimoji="1" lang="zh-CN" altLang="en-US" sz="1200" dirty="0"/>
                 <a:t> </a:t>
               </a:r>
               <a:r>
-                <a:rPr kumimoji="1" lang="en-US" altLang="zh-CN" sz="800" dirty="0"/>
+                <a:rPr kumimoji="1" lang="en-US" altLang="zh-CN" sz="1200" dirty="0"/>
                 <a:t>pre-defined</a:t>
               </a:r>
               <a:r>
-                <a:rPr kumimoji="1" lang="zh-CN" altLang="en-US" sz="800" dirty="0"/>
+                <a:rPr kumimoji="1" lang="zh-CN" altLang="en-US" sz="1200" dirty="0"/>
                 <a:t> </a:t>
               </a:r>
               <a:r>
-                <a:rPr kumimoji="1" lang="en-US" altLang="zh-CN" sz="800" dirty="0"/>
+                <a:rPr kumimoji="1" lang="en-US" altLang="zh-CN" sz="1200" dirty="0"/>
                 <a:t>gene</a:t>
               </a:r>
               <a:r>
-                <a:rPr kumimoji="1" lang="zh-CN" altLang="en-US" sz="800" dirty="0"/>
+                <a:rPr kumimoji="1" lang="zh-CN" altLang="en-US" sz="1200" dirty="0"/>
                 <a:t> </a:t>
               </a:r>
               <a:r>
-                <a:rPr kumimoji="1" lang="en-US" altLang="zh-CN" sz="800" dirty="0"/>
+                <a:rPr kumimoji="1" lang="en-US" altLang="zh-CN" sz="1200" dirty="0"/>
                 <a:t>with</a:t>
               </a:r>
               <a:r>
-                <a:rPr kumimoji="1" lang="zh-CN" altLang="en-US" sz="800" dirty="0"/>
+                <a:rPr kumimoji="1" lang="zh-CN" altLang="en-US" sz="1200" dirty="0"/>
                 <a:t> </a:t>
               </a:r>
               <a:r>
-                <a:rPr kumimoji="1" lang="en-US" altLang="zh-CN" sz="800" dirty="0"/>
+                <a:rPr kumimoji="1" lang="en-US" altLang="zh-CN" sz="1200" dirty="0"/>
                 <a:t>established</a:t>
               </a:r>
               <a:r>
-                <a:rPr kumimoji="1" lang="zh-CN" altLang="en-US" sz="800" dirty="0"/>
+                <a:rPr kumimoji="1" lang="zh-CN" altLang="en-US" sz="1200" dirty="0"/>
                 <a:t> </a:t>
               </a:r>
               <a:r>
-                <a:rPr kumimoji="1" lang="en-US" altLang="zh-CN" sz="800" dirty="0"/>
+                <a:rPr kumimoji="1" lang="en-US" altLang="zh-CN" sz="1200" dirty="0"/>
                 <a:t>ending.</a:t>
               </a:r>
-              <a:endParaRPr lang="en-US" sz="800" dirty="0">
+              <a:endParaRPr lang="en-US" sz="1200" dirty="0">
                 <a:solidFill>
                   <a:schemeClr val="bg1">
                     <a:lumMod val="65000"/>
@@ -7200,7 +7214,7 @@
           </p:nvSpPr>
           <p:spPr>
             <a:xfrm>
-              <a:off x="4071934" y="2285998"/>
+              <a:off x="4117963" y="2262789"/>
               <a:ext cx="685318" cy="352558"/>
             </a:xfrm>
             <a:prstGeom prst="rect">
@@ -7242,10 +7256,10 @@
         </p:nvGrpSpPr>
         <p:grpSpPr>
           <a:xfrm>
-            <a:off x="638048" y="2946673"/>
-            <a:ext cx="7579872" cy="370142"/>
-            <a:chOff x="2500298" y="1357304"/>
-            <a:chExt cx="5643602" cy="423996"/>
+            <a:off x="638048" y="2978209"/>
+            <a:ext cx="7577577" cy="307778"/>
+            <a:chOff x="2500298" y="1393427"/>
+            <a:chExt cx="5641893" cy="352558"/>
           </a:xfrm>
         </p:grpSpPr>
         <p:sp>
@@ -7314,8 +7328,8 @@
           </p:nvSpPr>
           <p:spPr>
             <a:xfrm>
-              <a:off x="5357818" y="1357304"/>
-              <a:ext cx="2786082" cy="246790"/>
+              <a:off x="5356109" y="1408097"/>
+              <a:ext cx="2786082" cy="317301"/>
             </a:xfrm>
             <a:prstGeom prst="rect">
               <a:avLst/>
@@ -7328,50 +7342,50 @@
             <a:lstStyle/>
             <a:p>
               <a:r>
-                <a:rPr kumimoji="1" lang="en-US" altLang="zh-CN" sz="800" dirty="0"/>
+                <a:rPr kumimoji="1" lang="en-US" altLang="zh-CN" sz="1200" dirty="0"/>
                 <a:t>From</a:t>
               </a:r>
               <a:r>
-                <a:rPr kumimoji="1" lang="zh-CN" altLang="en-US" sz="800" dirty="0"/>
+                <a:rPr kumimoji="1" lang="zh-CN" altLang="en-US" sz="1200" dirty="0"/>
                 <a:t> </a:t>
               </a:r>
               <a:r>
-                <a:rPr kumimoji="1" lang="en-US" altLang="zh-CN" sz="800" dirty="0"/>
+                <a:rPr kumimoji="1" lang="en-US" altLang="zh-CN" sz="1200" dirty="0"/>
                 <a:t>single</a:t>
               </a:r>
               <a:r>
-                <a:rPr kumimoji="1" lang="zh-CN" altLang="en-US" sz="800" dirty="0"/>
+                <a:rPr kumimoji="1" lang="zh-CN" altLang="en-US" sz="1200" dirty="0"/>
                 <a:t> </a:t>
               </a:r>
               <a:r>
-                <a:rPr kumimoji="1" lang="en-US" altLang="zh-CN" sz="800" dirty="0"/>
+                <a:rPr kumimoji="1" lang="en-US" altLang="zh-CN" sz="1200" dirty="0"/>
                 <a:t>track</a:t>
               </a:r>
               <a:r>
-                <a:rPr kumimoji="1" lang="zh-CN" altLang="en-US" sz="800" dirty="0"/>
+                <a:rPr kumimoji="1" lang="zh-CN" altLang="en-US" sz="1200" dirty="0"/>
                 <a:t> </a:t>
               </a:r>
               <a:r>
-                <a:rPr kumimoji="1" lang="en-US" altLang="zh-CN" sz="800" dirty="0"/>
+                <a:rPr kumimoji="1" lang="en-US" altLang="zh-CN" sz="1200" dirty="0"/>
                 <a:t>to</a:t>
               </a:r>
               <a:r>
-                <a:rPr kumimoji="1" lang="zh-CN" altLang="en-US" sz="800" dirty="0"/>
+                <a:rPr kumimoji="1" lang="zh-CN" altLang="en-US" sz="1200" dirty="0"/>
                 <a:t> </a:t>
               </a:r>
               <a:r>
-                <a:rPr kumimoji="1" lang="en-US" altLang="zh-CN" sz="800" dirty="0"/>
+                <a:rPr kumimoji="1" lang="en-US" altLang="zh-CN" sz="1200" dirty="0"/>
                 <a:t>multiple</a:t>
               </a:r>
               <a:r>
-                <a:rPr kumimoji="1" lang="zh-CN" altLang="en-US" sz="800" dirty="0"/>
+                <a:rPr kumimoji="1" lang="zh-CN" altLang="en-US" sz="1200" dirty="0"/>
                 <a:t> </a:t>
               </a:r>
               <a:r>
-                <a:rPr kumimoji="1" lang="en-US" altLang="zh-CN" sz="800" dirty="0"/>
+                <a:rPr kumimoji="1" lang="en-US" altLang="zh-CN" sz="1200" dirty="0"/>
                 <a:t>tracks</a:t>
               </a:r>
-              <a:endParaRPr lang="en-US" sz="800" dirty="0">
+              <a:endParaRPr lang="en-US" sz="1200" dirty="0">
                 <a:solidFill>
                   <a:schemeClr val="bg1">
                     <a:lumMod val="65000"/>
@@ -7398,7 +7412,7 @@
           </p:nvSpPr>
           <p:spPr>
             <a:xfrm>
-              <a:off x="4071934" y="1428742"/>
+              <a:off x="4117963" y="1393427"/>
               <a:ext cx="693911" cy="352558"/>
             </a:xfrm>
             <a:prstGeom prst="rect">
@@ -7483,10 +7497,10 @@
         </p:nvGrpSpPr>
         <p:grpSpPr>
           <a:xfrm>
-            <a:off x="633290" y="3420620"/>
-            <a:ext cx="7579872" cy="307777"/>
-            <a:chOff x="2500298" y="2285998"/>
-            <a:chExt cx="5643602" cy="352558"/>
+            <a:off x="633290" y="3407720"/>
+            <a:ext cx="7582335" cy="307777"/>
+            <a:chOff x="2500298" y="2271221"/>
+            <a:chExt cx="5645436" cy="352558"/>
           </a:xfrm>
         </p:grpSpPr>
         <p:sp>
@@ -7510,7 +7524,9 @@
               <a:avLst/>
             </a:prstGeom>
             <a:solidFill>
-              <a:schemeClr val="accent2"/>
+              <a:schemeClr val="accent2">
+                <a:lumMod val="50000"/>
+              </a:schemeClr>
             </a:solidFill>
             <a:ln>
               <a:noFill/>
@@ -7598,8 +7614,8 @@
           </p:nvSpPr>
           <p:spPr>
             <a:xfrm>
-              <a:off x="5357818" y="2285998"/>
-              <a:ext cx="2786082" cy="246790"/>
+              <a:off x="5359652" y="2290142"/>
+              <a:ext cx="2786082" cy="317302"/>
             </a:xfrm>
             <a:prstGeom prst="rect">
               <a:avLst/>
@@ -7612,66 +7628,66 @@
             <a:lstStyle/>
             <a:p>
               <a:r>
-                <a:rPr kumimoji="1" lang="en-US" altLang="zh-CN" sz="800" dirty="0"/>
+                <a:rPr kumimoji="1" lang="en-US" altLang="zh-CN" sz="1200" dirty="0"/>
                 <a:t>A</a:t>
               </a:r>
               <a:r>
-                <a:rPr kumimoji="1" lang="zh-CN" altLang="en-US" sz="800" dirty="0"/>
+                <a:rPr kumimoji="1" lang="zh-CN" altLang="en-US" sz="1200" dirty="0"/>
                 <a:t> </a:t>
               </a:r>
               <a:r>
-                <a:rPr kumimoji="1" lang="en-US" altLang="zh-CN" sz="800" dirty="0"/>
+                <a:rPr kumimoji="1" lang="en-US" altLang="zh-CN" sz="1200" dirty="0"/>
                 <a:t>dynamic</a:t>
               </a:r>
               <a:r>
-                <a:rPr kumimoji="1" lang="zh-CN" altLang="en-US" sz="800" dirty="0"/>
+                <a:rPr kumimoji="1" lang="zh-CN" altLang="en-US" sz="1200" dirty="0"/>
                 <a:t> </a:t>
               </a:r>
               <a:r>
-                <a:rPr kumimoji="1" lang="en-US" altLang="zh-CN" sz="800" dirty="0"/>
+                <a:rPr kumimoji="1" lang="en-US" altLang="zh-CN" sz="1200" dirty="0"/>
                 <a:t>programming</a:t>
               </a:r>
               <a:r>
-                <a:rPr kumimoji="1" lang="zh-CN" altLang="en-US" sz="800" dirty="0"/>
+                <a:rPr kumimoji="1" lang="zh-CN" altLang="en-US" sz="1200" dirty="0"/>
                 <a:t> </a:t>
               </a:r>
               <a:r>
-                <a:rPr kumimoji="1" lang="en-US" altLang="zh-CN" sz="800" dirty="0"/>
+                <a:rPr kumimoji="1" lang="en-US" altLang="zh-CN" sz="1200" dirty="0"/>
                 <a:t>is</a:t>
               </a:r>
               <a:r>
-                <a:rPr kumimoji="1" lang="zh-CN" altLang="en-US" sz="800" dirty="0"/>
+                <a:rPr kumimoji="1" lang="zh-CN" altLang="en-US" sz="1200" dirty="0"/>
                 <a:t> </a:t>
               </a:r>
               <a:r>
-                <a:rPr kumimoji="1" lang="en-US" altLang="zh-CN" sz="800" dirty="0"/>
+                <a:rPr kumimoji="1" lang="en-US" altLang="zh-CN" sz="1200" dirty="0"/>
                 <a:t>applied</a:t>
               </a:r>
               <a:r>
-                <a:rPr kumimoji="1" lang="zh-CN" altLang="en-US" sz="800" dirty="0"/>
+                <a:rPr kumimoji="1" lang="zh-CN" altLang="en-US" sz="1200" dirty="0"/>
                 <a:t> </a:t>
               </a:r>
               <a:r>
-                <a:rPr kumimoji="1" lang="en-US" altLang="zh-CN" sz="800" dirty="0"/>
+                <a:rPr kumimoji="1" lang="en-US" altLang="zh-CN" sz="1200" dirty="0"/>
                 <a:t>to</a:t>
               </a:r>
               <a:r>
-                <a:rPr kumimoji="1" lang="zh-CN" altLang="en-US" sz="800" dirty="0"/>
+                <a:rPr kumimoji="1" lang="zh-CN" altLang="en-US" sz="1200" dirty="0"/>
                 <a:t> </a:t>
               </a:r>
               <a:r>
-                <a:rPr kumimoji="1" lang="en-US" altLang="zh-CN" sz="800" dirty="0"/>
+                <a:rPr kumimoji="1" lang="en-US" altLang="zh-CN" sz="1200" dirty="0"/>
                 <a:t>generate</a:t>
               </a:r>
               <a:r>
-                <a:rPr kumimoji="1" lang="zh-CN" altLang="en-US" sz="800" dirty="0"/>
+                <a:rPr kumimoji="1" lang="zh-CN" altLang="en-US" sz="1200" dirty="0"/>
                 <a:t> </a:t>
               </a:r>
               <a:r>
-                <a:rPr kumimoji="1" lang="en-US" altLang="zh-CN" sz="800" dirty="0"/>
+                <a:rPr kumimoji="1" lang="en-US" altLang="zh-CN" sz="1200" dirty="0"/>
                 <a:t>chord</a:t>
               </a:r>
-              <a:endParaRPr lang="en-US" sz="800" dirty="0">
+              <a:endParaRPr lang="en-US" sz="1200" dirty="0">
                 <a:solidFill>
                   <a:schemeClr val="bg1">
                     <a:lumMod val="65000"/>
@@ -7698,7 +7714,7 @@
           </p:nvSpPr>
           <p:spPr>
             <a:xfrm>
-              <a:off x="4071934" y="2285998"/>
+              <a:off x="4133487" y="2271221"/>
               <a:ext cx="685318" cy="352558"/>
             </a:xfrm>
             <a:prstGeom prst="rect">
@@ -7740,10 +7756,10 @@
         </p:nvGrpSpPr>
         <p:grpSpPr>
           <a:xfrm>
-            <a:off x="633290" y="3927816"/>
-            <a:ext cx="7579872" cy="370142"/>
-            <a:chOff x="2500298" y="1357304"/>
-            <a:chExt cx="5643602" cy="423996"/>
+            <a:off x="633290" y="3959351"/>
+            <a:ext cx="7575115" cy="307778"/>
+            <a:chOff x="2500298" y="1393426"/>
+            <a:chExt cx="5640060" cy="352558"/>
           </a:xfrm>
         </p:grpSpPr>
         <p:sp>
@@ -7812,8 +7828,8 @@
           </p:nvSpPr>
           <p:spPr>
             <a:xfrm>
-              <a:off x="5357818" y="1357304"/>
-              <a:ext cx="2786082" cy="246790"/>
+              <a:off x="5354276" y="1411054"/>
+              <a:ext cx="2786082" cy="317301"/>
             </a:xfrm>
             <a:prstGeom prst="rect">
               <a:avLst/>
@@ -7826,34 +7842,34 @@
             <a:lstStyle/>
             <a:p>
               <a:r>
-                <a:rPr kumimoji="1" lang="en-US" altLang="zh-CN" sz="800" dirty="0"/>
+                <a:rPr kumimoji="1" lang="en-US" altLang="zh-CN" sz="1200" dirty="0"/>
                 <a:t>Blocking</a:t>
               </a:r>
               <a:r>
-                <a:rPr kumimoji="1" lang="zh-CN" altLang="en-US" sz="800" dirty="0"/>
+                <a:rPr kumimoji="1" lang="zh-CN" altLang="en-US" sz="1200" dirty="0"/>
                 <a:t> </a:t>
               </a:r>
               <a:r>
-                <a:rPr kumimoji="1" lang="en-US" altLang="zh-CN" sz="800" dirty="0"/>
+                <a:rPr kumimoji="1" lang="en-US" altLang="zh-CN" sz="1200" dirty="0"/>
                 <a:t>wait</a:t>
               </a:r>
               <a:r>
-                <a:rPr kumimoji="1" lang="zh-CN" altLang="en-US" sz="800" dirty="0"/>
+                <a:rPr kumimoji="1" lang="zh-CN" altLang="en-US" sz="1200" dirty="0"/>
                 <a:t> </a:t>
               </a:r>
               <a:r>
-                <a:rPr kumimoji="1" lang="en-US" altLang="zh-CN" sz="800" dirty="0"/>
+                <a:rPr kumimoji="1" lang="en-US" altLang="zh-CN" sz="1200" dirty="0"/>
                 <a:t>in</a:t>
               </a:r>
               <a:r>
-                <a:rPr kumimoji="1" lang="zh-CN" altLang="en-US" sz="800" dirty="0"/>
+                <a:rPr kumimoji="1" lang="zh-CN" altLang="en-US" sz="1200" dirty="0"/>
                 <a:t> </a:t>
               </a:r>
               <a:r>
-                <a:rPr kumimoji="1" lang="en-US" altLang="zh-CN" sz="800" dirty="0"/>
+                <a:rPr kumimoji="1" lang="en-US" altLang="zh-CN" sz="1200" dirty="0"/>
                 <a:t>GUI</a:t>
               </a:r>
-              <a:endParaRPr lang="en-US" sz="800" dirty="0">
+              <a:endParaRPr lang="en-US" sz="1200" dirty="0">
                 <a:solidFill>
                   <a:schemeClr val="bg1">
                     <a:lumMod val="65000"/>
@@ -7880,7 +7896,7 @@
           </p:nvSpPr>
           <p:spPr>
             <a:xfrm>
-              <a:off x="4071934" y="1428742"/>
+              <a:off x="4133602" y="1393426"/>
               <a:ext cx="693911" cy="352558"/>
             </a:xfrm>
             <a:prstGeom prst="rect">
@@ -7965,10 +7981,10 @@
         </p:nvGrpSpPr>
         <p:grpSpPr>
           <a:xfrm>
-            <a:off x="628532" y="4401763"/>
-            <a:ext cx="7579872" cy="307777"/>
-            <a:chOff x="2500298" y="2285998"/>
-            <a:chExt cx="5643602" cy="352558"/>
+            <a:off x="628532" y="4370985"/>
+            <a:ext cx="7579873" cy="307777"/>
+            <a:chOff x="2500298" y="2250742"/>
+            <a:chExt cx="5643603" cy="352558"/>
           </a:xfrm>
         </p:grpSpPr>
         <p:sp>
@@ -7992,7 +8008,9 @@
               <a:avLst/>
             </a:prstGeom>
             <a:solidFill>
-              <a:schemeClr val="accent2"/>
+              <a:schemeClr val="accent2">
+                <a:lumMod val="50000"/>
+              </a:schemeClr>
             </a:solidFill>
             <a:ln>
               <a:noFill/>
@@ -8080,8 +8098,8 @@
           </p:nvSpPr>
           <p:spPr>
             <a:xfrm>
-              <a:off x="5357818" y="2285998"/>
-              <a:ext cx="2786082" cy="246791"/>
+              <a:off x="5357819" y="2271228"/>
+              <a:ext cx="2786082" cy="317302"/>
             </a:xfrm>
             <a:prstGeom prst="rect">
               <a:avLst/>
@@ -8094,18 +8112,18 @@
             <a:lstStyle/>
             <a:p>
               <a:r>
-                <a:rPr kumimoji="1" lang="en-US" altLang="zh-CN" sz="800" dirty="0"/>
+                <a:rPr kumimoji="1" lang="en-US" altLang="zh-CN" sz="1200" dirty="0"/>
                 <a:t>Asynchronous</a:t>
               </a:r>
               <a:r>
-                <a:rPr kumimoji="1" lang="zh-CN" altLang="en-US" sz="800" dirty="0"/>
+                <a:rPr kumimoji="1" lang="zh-CN" altLang="en-US" sz="1200" dirty="0"/>
                 <a:t> </a:t>
               </a:r>
               <a:r>
-                <a:rPr kumimoji="1" lang="en-US" altLang="zh-CN" sz="800" dirty="0"/>
+                <a:rPr kumimoji="1" lang="en-US" altLang="zh-CN" sz="1200" dirty="0"/>
                 <a:t>requests</a:t>
               </a:r>
-              <a:endParaRPr lang="en-US" sz="800" dirty="0">
+              <a:endParaRPr lang="en-US" sz="1200" dirty="0">
                 <a:solidFill>
                   <a:schemeClr val="bg1">
                     <a:lumMod val="65000"/>
@@ -8132,7 +8150,7 @@
           </p:nvSpPr>
           <p:spPr>
             <a:xfrm>
-              <a:off x="4071934" y="2285998"/>
+              <a:off x="4137144" y="2250742"/>
               <a:ext cx="685318" cy="352558"/>
             </a:xfrm>
             <a:prstGeom prst="rect">
@@ -9213,6 +9231,13 @@
   <p:transition spd="slow">
     <p:push dir="d"/>
   </p:transition>
+  <p:timing>
+    <p:tnLst>
+      <p:par>
+        <p:cTn id="1" dur="indefinite" restart="never" nodeType="tmRoot"/>
+      </p:par>
+    </p:tnLst>
+  </p:timing>
 </p:sld>
 </file>
 
@@ -9670,10 +9695,10 @@
         </p:nvGrpSpPr>
         <p:grpSpPr bwMode="auto">
           <a:xfrm>
-            <a:off x="1185184" y="1483854"/>
-            <a:ext cx="2321664" cy="939982"/>
-            <a:chOff x="4267635" y="880115"/>
-            <a:chExt cx="2320294" cy="939824"/>
+            <a:off x="539552" y="1483854"/>
+            <a:ext cx="2967296" cy="1329191"/>
+            <a:chOff x="3622384" y="880115"/>
+            <a:chExt cx="2965545" cy="1328969"/>
           </a:xfrm>
         </p:grpSpPr>
         <p:sp>
@@ -9686,8 +9711,8 @@
           </p:nvSpPr>
           <p:spPr bwMode="auto">
             <a:xfrm>
-              <a:off x="4267635" y="1101273"/>
-              <a:ext cx="2320294" cy="718666"/>
+              <a:off x="3622384" y="1101273"/>
+              <a:ext cx="2965545" cy="1107811"/>
             </a:xfrm>
             <a:prstGeom prst="rect">
               <a:avLst/>
@@ -9834,234 +9859,234 @@
                 </a:lnSpc>
               </a:pPr>
               <a:r>
-                <a:rPr lang="en-US" altLang="zh-CN" sz="800" dirty="0"/>
+                <a:rPr lang="en-US" altLang="zh-CN" sz="1200" dirty="0"/>
                 <a:t>Let</a:t>
               </a:r>
               <a:r>
-                <a:rPr lang="zh-CN" altLang="en-US" sz="800" dirty="0"/>
+                <a:rPr lang="zh-CN" altLang="en-US" sz="1200" dirty="0"/>
                 <a:t> </a:t>
               </a:r>
               <a:r>
-                <a:rPr lang="en-US" altLang="zh-CN" sz="800" dirty="0"/>
+                <a:rPr lang="en-US" altLang="zh-CN" sz="1200" dirty="0"/>
                 <a:t>the</a:t>
               </a:r>
               <a:r>
-                <a:rPr lang="zh-CN" altLang="en-US" sz="800" dirty="0"/>
+                <a:rPr lang="zh-CN" altLang="en-US" sz="1200" dirty="0"/>
                 <a:t> </a:t>
               </a:r>
               <a:r>
-                <a:rPr lang="en-US" altLang="zh-CN" sz="800" dirty="0"/>
+                <a:rPr lang="en-US" altLang="zh-CN" sz="1200" dirty="0"/>
                 <a:t>program</a:t>
               </a:r>
               <a:r>
-                <a:rPr lang="zh-CN" altLang="en-US" sz="800" dirty="0"/>
+                <a:rPr lang="zh-CN" altLang="en-US" sz="1200" dirty="0"/>
                 <a:t> </a:t>
               </a:r>
               <a:r>
-                <a:rPr lang="en-US" altLang="zh-CN" sz="800" dirty="0"/>
+                <a:rPr lang="en-US" altLang="zh-CN" sz="1200" dirty="0"/>
                 <a:t>compose</a:t>
               </a:r>
               <a:r>
-                <a:rPr lang="zh-CN" altLang="en-US" sz="800" dirty="0"/>
+                <a:rPr lang="zh-CN" altLang="en-US" sz="1200" dirty="0"/>
                 <a:t> </a:t>
               </a:r>
               <a:r>
-                <a:rPr lang="en-US" altLang="zh-CN" sz="800" dirty="0"/>
+                <a:rPr lang="en-US" altLang="zh-CN" sz="1200" dirty="0"/>
                 <a:t>not</a:t>
               </a:r>
               <a:r>
-                <a:rPr lang="zh-CN" altLang="en-US" sz="800" dirty="0"/>
+                <a:rPr lang="zh-CN" altLang="en-US" sz="1200" dirty="0"/>
                 <a:t> </a:t>
               </a:r>
               <a:r>
-                <a:rPr lang="en-US" altLang="zh-CN" sz="800" dirty="0"/>
+                <a:rPr lang="en-US" altLang="zh-CN" sz="1200" dirty="0"/>
                 <a:t>only</a:t>
               </a:r>
               <a:r>
-                <a:rPr lang="zh-CN" altLang="en-US" sz="800" dirty="0"/>
+                <a:rPr lang="zh-CN" altLang="en-US" sz="1200" dirty="0"/>
                 <a:t> </a:t>
               </a:r>
               <a:r>
-                <a:rPr lang="en-US" altLang="zh-CN" sz="800" dirty="0"/>
+                <a:rPr lang="en-US" altLang="zh-CN" sz="1200" dirty="0"/>
                 <a:t>melody</a:t>
               </a:r>
               <a:r>
-                <a:rPr lang="zh-CN" altLang="en-US" sz="800" dirty="0"/>
+                <a:rPr lang="zh-CN" altLang="en-US" sz="1200" dirty="0"/>
                 <a:t> </a:t>
               </a:r>
               <a:r>
-                <a:rPr lang="en-US" altLang="zh-CN" sz="800" dirty="0"/>
+                <a:rPr lang="en-US" altLang="zh-CN" sz="1200" dirty="0"/>
                 <a:t>but</a:t>
               </a:r>
               <a:r>
-                <a:rPr lang="zh-CN" altLang="en-US" sz="800" dirty="0"/>
+                <a:rPr lang="zh-CN" altLang="en-US" sz="1200" dirty="0"/>
                 <a:t> </a:t>
               </a:r>
               <a:r>
-                <a:rPr lang="en-US" altLang="zh-CN" sz="800" dirty="0"/>
+                <a:rPr lang="en-US" altLang="zh-CN" sz="1200" dirty="0"/>
                 <a:t>also</a:t>
               </a:r>
               <a:r>
-                <a:rPr lang="zh-CN" altLang="en-US" sz="800" dirty="0"/>
+                <a:rPr lang="zh-CN" altLang="en-US" sz="1200" dirty="0"/>
                 <a:t> </a:t>
               </a:r>
               <a:r>
-                <a:rPr lang="en-US" altLang="zh-CN" sz="800" dirty="0"/>
+                <a:rPr lang="en-US" altLang="zh-CN" sz="1200" dirty="0"/>
                 <a:t>instrument</a:t>
               </a:r>
               <a:r>
-                <a:rPr lang="zh-CN" altLang="en-US" sz="800" dirty="0"/>
+                <a:rPr lang="zh-CN" altLang="en-US" sz="1200" dirty="0"/>
                 <a:t> </a:t>
               </a:r>
               <a:r>
-                <a:rPr lang="en-US" altLang="zh-CN" sz="800" dirty="0"/>
+                <a:rPr lang="en-US" altLang="zh-CN" sz="1200" dirty="0"/>
                 <a:t>arrangement.</a:t>
               </a:r>
               <a:r>
-                <a:rPr lang="zh-CN" altLang="en-US" sz="800" dirty="0"/>
+                <a:rPr lang="zh-CN" altLang="en-US" sz="1200" dirty="0"/>
                 <a:t>  </a:t>
               </a:r>
               <a:r>
-                <a:rPr lang="en-US" altLang="zh-CN" sz="800" dirty="0"/>
+                <a:rPr lang="en-US" altLang="zh-CN" sz="1200" dirty="0"/>
                 <a:t>A</a:t>
               </a:r>
               <a:r>
-                <a:rPr lang="zh-CN" altLang="en-US" sz="800" dirty="0"/>
+                <a:rPr lang="zh-CN" altLang="en-US" sz="1200" dirty="0"/>
                 <a:t> </a:t>
               </a:r>
               <a:r>
-                <a:rPr lang="en-US" altLang="zh-CN" sz="800" dirty="0"/>
+                <a:rPr lang="en-US" altLang="zh-CN" sz="1200" dirty="0"/>
                 <a:t>novel</a:t>
               </a:r>
               <a:r>
-                <a:rPr lang="zh-CN" altLang="en-US" sz="800" dirty="0"/>
+                <a:rPr lang="zh-CN" altLang="en-US" sz="1200" dirty="0"/>
                 <a:t> </a:t>
               </a:r>
               <a:r>
-                <a:rPr lang="en-US" altLang="zh-CN" sz="800" dirty="0"/>
+                <a:rPr lang="en-US" altLang="zh-CN" sz="1200" dirty="0"/>
                 <a:t>algorithm</a:t>
               </a:r>
               <a:r>
-                <a:rPr lang="zh-CN" altLang="en-US" sz="800" dirty="0"/>
+                <a:rPr lang="zh-CN" altLang="en-US" sz="1200" dirty="0"/>
                 <a:t> </a:t>
               </a:r>
               <a:r>
-                <a:rPr lang="en-US" altLang="zh-CN" sz="800" dirty="0"/>
+                <a:rPr lang="en-US" altLang="zh-CN" sz="1200" dirty="0"/>
                 <a:t>must</a:t>
               </a:r>
               <a:r>
-                <a:rPr lang="zh-CN" altLang="en-US" sz="800" dirty="0"/>
+                <a:rPr lang="zh-CN" altLang="en-US" sz="1200" dirty="0"/>
                 <a:t> </a:t>
               </a:r>
               <a:r>
-                <a:rPr lang="en-US" altLang="zh-CN" sz="800" dirty="0"/>
+                <a:rPr lang="en-US" altLang="zh-CN" sz="1200" dirty="0"/>
                 <a:t>be</a:t>
               </a:r>
               <a:r>
-                <a:rPr lang="zh-CN" altLang="en-US" sz="800" dirty="0"/>
+                <a:rPr lang="zh-CN" altLang="en-US" sz="1200" dirty="0"/>
                 <a:t> </a:t>
               </a:r>
               <a:r>
-                <a:rPr lang="en-US" altLang="zh-CN" sz="800" dirty="0"/>
+                <a:rPr lang="en-US" altLang="zh-CN" sz="1200" dirty="0"/>
                 <a:t>applied</a:t>
               </a:r>
               <a:r>
-                <a:rPr lang="zh-CN" altLang="en-US" sz="800" dirty="0"/>
+                <a:rPr lang="zh-CN" altLang="en-US" sz="1200" dirty="0"/>
                 <a:t> </a:t>
               </a:r>
               <a:r>
-                <a:rPr lang="en-US" altLang="zh-CN" sz="800" dirty="0"/>
+                <a:rPr lang="en-US" altLang="zh-CN" sz="1200" dirty="0"/>
                 <a:t>on</a:t>
               </a:r>
               <a:r>
-                <a:rPr lang="zh-CN" altLang="en-US" sz="800" dirty="0"/>
+                <a:rPr lang="zh-CN" altLang="en-US" sz="1200" dirty="0"/>
                 <a:t> </a:t>
               </a:r>
               <a:r>
-                <a:rPr lang="en-US" altLang="zh-CN" sz="800" dirty="0"/>
+                <a:rPr lang="en-US" altLang="zh-CN" sz="1200" dirty="0"/>
                 <a:t>it.</a:t>
               </a:r>
               <a:r>
-                <a:rPr lang="zh-CN" altLang="en-US" sz="800" dirty="0"/>
+                <a:rPr lang="zh-CN" altLang="en-US" sz="1200" dirty="0"/>
                 <a:t>  </a:t>
               </a:r>
               <a:r>
-                <a:rPr lang="en-US" altLang="zh-CN" sz="800" dirty="0"/>
+                <a:rPr lang="en-US" altLang="zh-CN" sz="1200" dirty="0"/>
                 <a:t>If</a:t>
               </a:r>
               <a:r>
-                <a:rPr lang="zh-CN" altLang="en-US" sz="800" dirty="0"/>
+                <a:rPr lang="zh-CN" altLang="en-US" sz="1200" dirty="0"/>
                 <a:t> </a:t>
               </a:r>
               <a:r>
-                <a:rPr lang="en-US" altLang="zh-CN" sz="800" dirty="0"/>
+                <a:rPr lang="en-US" altLang="zh-CN" sz="1200" dirty="0"/>
                 <a:t>possible,</a:t>
               </a:r>
               <a:r>
-                <a:rPr lang="zh-CN" altLang="en-US" sz="800" dirty="0"/>
+                <a:rPr lang="zh-CN" altLang="en-US" sz="1200" dirty="0"/>
                 <a:t> </a:t>
               </a:r>
               <a:r>
-                <a:rPr lang="en-US" altLang="zh-CN" sz="800" dirty="0"/>
+                <a:rPr lang="en-US" altLang="zh-CN" sz="1200" dirty="0"/>
                 <a:t>add</a:t>
               </a:r>
               <a:r>
-                <a:rPr lang="zh-CN" altLang="en-US" sz="800" dirty="0"/>
+                <a:rPr lang="zh-CN" altLang="en-US" sz="1200" dirty="0"/>
                 <a:t> </a:t>
               </a:r>
               <a:r>
-                <a:rPr lang="en-US" altLang="zh-CN" sz="800" dirty="0"/>
+                <a:rPr lang="en-US" altLang="zh-CN" sz="1200" dirty="0"/>
                 <a:t>velocity</a:t>
               </a:r>
               <a:r>
-                <a:rPr lang="zh-CN" altLang="en-US" sz="800" dirty="0"/>
+                <a:rPr lang="zh-CN" altLang="en-US" sz="1200" dirty="0"/>
                 <a:t> </a:t>
               </a:r>
               <a:r>
-                <a:rPr lang="en-US" altLang="zh-CN" sz="800" dirty="0"/>
+                <a:rPr lang="en-US" altLang="zh-CN" sz="1200" dirty="0"/>
                 <a:t>performance</a:t>
               </a:r>
               <a:r>
-                <a:rPr lang="zh-CN" altLang="en-US" sz="800" dirty="0"/>
+                <a:rPr lang="zh-CN" altLang="en-US" sz="1200" dirty="0"/>
                 <a:t> </a:t>
               </a:r>
               <a:r>
-                <a:rPr lang="en-US" altLang="zh-CN" sz="800" dirty="0"/>
+                <a:rPr lang="en-US" altLang="zh-CN" sz="1200" dirty="0"/>
                 <a:t>to</a:t>
               </a:r>
               <a:r>
-                <a:rPr lang="zh-CN" altLang="en-US" sz="800" dirty="0"/>
+                <a:rPr lang="zh-CN" altLang="en-US" sz="1200" dirty="0"/>
                 <a:t> </a:t>
               </a:r>
               <a:r>
-                <a:rPr lang="en-US" altLang="zh-CN" sz="800" dirty="0"/>
+                <a:rPr lang="en-US" altLang="zh-CN" sz="1200" dirty="0"/>
                 <a:t>output</a:t>
               </a:r>
               <a:r>
-                <a:rPr lang="zh-CN" altLang="en-US" sz="800" dirty="0"/>
+                <a:rPr lang="zh-CN" altLang="en-US" sz="1200" dirty="0"/>
                 <a:t> </a:t>
               </a:r>
               <a:r>
-                <a:rPr lang="en-US" altLang="zh-CN" sz="800" dirty="0"/>
+                <a:rPr lang="en-US" altLang="zh-CN" sz="1200" dirty="0"/>
                 <a:t>a</a:t>
               </a:r>
               <a:r>
-                <a:rPr lang="zh-CN" altLang="en-US" sz="800" dirty="0"/>
+                <a:rPr lang="zh-CN" altLang="en-US" sz="1200" dirty="0"/>
                 <a:t> </a:t>
               </a:r>
               <a:r>
-                <a:rPr lang="en-US" altLang="zh-CN" sz="800" dirty="0"/>
+                <a:rPr lang="en-US" altLang="zh-CN" sz="1200" dirty="0"/>
                 <a:t>wav</a:t>
               </a:r>
               <a:r>
-                <a:rPr lang="zh-CN" altLang="en-US" sz="800" dirty="0"/>
+                <a:rPr lang="zh-CN" altLang="en-US" sz="1200" dirty="0"/>
                 <a:t> </a:t>
               </a:r>
               <a:r>
-                <a:rPr lang="en-US" altLang="zh-CN" sz="800" dirty="0"/>
+                <a:rPr lang="en-US" altLang="zh-CN" sz="1200" dirty="0"/>
                 <a:t>file.</a:t>
               </a:r>
-              <a:endParaRPr lang="en-GB" altLang="zh-CN" sz="600" dirty="0">
+              <a:endParaRPr lang="en-GB" altLang="zh-CN" sz="1050" dirty="0">
                 <a:solidFill>
                   <a:schemeClr val="bg1">
                     <a:lumMod val="65000"/>
@@ -10085,8 +10110,8 @@
           </p:nvSpPr>
           <p:spPr bwMode="auto">
             <a:xfrm>
-              <a:off x="5850983" y="880115"/>
-              <a:ext cx="736946" cy="153862"/>
+              <a:off x="5554602" y="880115"/>
+              <a:ext cx="1033327" cy="215408"/>
             </a:xfrm>
             <a:prstGeom prst="rect">
               <a:avLst/>
@@ -10152,7 +10177,7 @@
             <a:p>
               <a:pPr algn="r"/>
               <a:r>
-                <a:rPr lang="en-US" altLang="zh-CN" sz="1000" dirty="0">
+                <a:rPr lang="en-US" altLang="zh-CN" sz="1400" dirty="0">
                   <a:solidFill>
                     <a:schemeClr val="bg1">
                       <a:lumMod val="65000"/>
@@ -10164,7 +10189,7 @@
                 </a:rPr>
                 <a:t>Arrangement</a:t>
               </a:r>
-              <a:endParaRPr lang="zh-CN" altLang="en-US" sz="1000" dirty="0">
+              <a:endParaRPr lang="zh-CN" altLang="en-US" sz="1400" dirty="0">
                 <a:solidFill>
                   <a:schemeClr val="bg1">
                     <a:lumMod val="65000"/>
@@ -10188,10 +10213,10 @@
         </p:nvGrpSpPr>
         <p:grpSpPr bwMode="auto">
           <a:xfrm>
-            <a:off x="1185184" y="3423869"/>
-            <a:ext cx="2321664" cy="617305"/>
-            <a:chOff x="4267635" y="880115"/>
-            <a:chExt cx="2320294" cy="617202"/>
+            <a:off x="647563" y="3423869"/>
+            <a:ext cx="2859284" cy="775681"/>
+            <a:chOff x="3730332" y="880115"/>
+            <a:chExt cx="2857597" cy="775551"/>
           </a:xfrm>
         </p:grpSpPr>
         <p:sp>
@@ -10204,8 +10229,8 @@
           </p:nvSpPr>
           <p:spPr bwMode="auto">
             <a:xfrm>
-              <a:off x="4267635" y="1147920"/>
-              <a:ext cx="2320294" cy="349397"/>
+              <a:off x="3730332" y="1147920"/>
+              <a:ext cx="2857597" cy="507746"/>
             </a:xfrm>
             <a:prstGeom prst="rect">
               <a:avLst/>
@@ -10352,118 +10377,122 @@
                 </a:lnSpc>
               </a:pPr>
               <a:r>
-                <a:rPr lang="en-US" altLang="zh-CN" sz="800" dirty="0"/>
+                <a:rPr lang="en-US" altLang="zh-CN" sz="1100" dirty="0"/>
                 <a:t>A</a:t>
               </a:r>
               <a:r>
-                <a:rPr lang="zh-CN" altLang="en-US" sz="800" dirty="0"/>
+                <a:rPr lang="zh-CN" altLang="en-US" sz="1100" dirty="0"/>
                 <a:t> </a:t>
               </a:r>
               <a:r>
-                <a:rPr lang="en-US" altLang="zh-CN" sz="800" dirty="0"/>
+                <a:rPr lang="en-US" altLang="zh-CN" sz="1100" dirty="0"/>
                 <a:t>user-friendly</a:t>
               </a:r>
               <a:r>
-                <a:rPr lang="zh-CN" altLang="en-US" sz="800" dirty="0"/>
+                <a:rPr lang="zh-CN" altLang="en-US" sz="1100" dirty="0"/>
                 <a:t> </a:t>
               </a:r>
               <a:r>
-                <a:rPr lang="en-US" altLang="zh-CN" sz="800" dirty="0"/>
+                <a:rPr lang="en-US" altLang="zh-CN" sz="1100" dirty="0"/>
                 <a:t>guide</a:t>
               </a:r>
               <a:r>
-                <a:rPr lang="zh-CN" altLang="en-US" sz="800" dirty="0"/>
+                <a:rPr lang="zh-CN" altLang="en-US" sz="1100" dirty="0"/>
                 <a:t> </a:t>
               </a:r>
               <a:r>
-                <a:rPr lang="en-US" altLang="zh-CN" sz="800" dirty="0"/>
+                <a:rPr lang="en-US" altLang="zh-CN" sz="1100" dirty="0"/>
                 <a:t>for</a:t>
               </a:r>
               <a:r>
-                <a:rPr lang="zh-CN" altLang="en-US" sz="800" dirty="0"/>
+                <a:rPr lang="zh-CN" altLang="en-US" sz="1100" dirty="0"/>
                 <a:t> </a:t>
               </a:r>
               <a:r>
-                <a:rPr lang="en-US" altLang="zh-CN" sz="800" dirty="0" err="1"/>
-                <a:t>abcnotion</a:t>
-              </a:r>
-              <a:r>
-                <a:rPr lang="en-US" altLang="zh-CN" sz="800" dirty="0"/>
+                <a:rPr lang="en-US" altLang="zh-CN" sz="1100" dirty="0" err="1" smtClean="0"/>
+                <a:t>abc</a:t>
+              </a:r>
+              <a:r>
+                <a:rPr lang="en-US" altLang="zh-CN" sz="1100" dirty="0" smtClean="0"/>
+                <a:t> notion</a:t>
+              </a:r>
+              <a:r>
+                <a:rPr lang="en-US" altLang="zh-CN" sz="1100" dirty="0"/>
                 <a:t>.</a:t>
               </a:r>
               <a:r>
-                <a:rPr lang="zh-CN" altLang="en-US" sz="800" dirty="0"/>
+                <a:rPr lang="zh-CN" altLang="en-US" sz="1100" dirty="0"/>
                 <a:t>  </a:t>
               </a:r>
               <a:r>
-                <a:rPr lang="en-US" altLang="zh-CN" sz="800" dirty="0"/>
+                <a:rPr lang="en-US" altLang="zh-CN" sz="1100" dirty="0"/>
                 <a:t>No</a:t>
               </a:r>
               <a:r>
-                <a:rPr lang="zh-CN" altLang="en-US" sz="800" dirty="0"/>
+                <a:rPr lang="zh-CN" altLang="en-US" sz="1100" dirty="0"/>
                 <a:t> </a:t>
               </a:r>
               <a:r>
-                <a:rPr lang="en-US" altLang="zh-CN" sz="800" dirty="0"/>
+                <a:rPr lang="en-US" altLang="zh-CN" sz="1100" dirty="0"/>
                 <a:t>matter</a:t>
               </a:r>
               <a:r>
-                <a:rPr lang="zh-CN" altLang="en-US" sz="800" dirty="0"/>
+                <a:rPr lang="zh-CN" altLang="en-US" sz="1100" dirty="0"/>
                 <a:t> </a:t>
               </a:r>
               <a:r>
-                <a:rPr lang="en-US" altLang="zh-CN" sz="800" dirty="0"/>
+                <a:rPr lang="en-US" altLang="zh-CN" sz="1100" dirty="0"/>
                 <a:t>it’s</a:t>
               </a:r>
               <a:r>
-                <a:rPr lang="zh-CN" altLang="en-US" sz="800" dirty="0"/>
+                <a:rPr lang="zh-CN" altLang="en-US" sz="1100" dirty="0"/>
                 <a:t> </a:t>
               </a:r>
               <a:r>
-                <a:rPr lang="en-US" altLang="zh-CN" sz="800" dirty="0"/>
+                <a:rPr lang="en-US" altLang="zh-CN" sz="1100" dirty="0"/>
                 <a:t>a</a:t>
               </a:r>
               <a:r>
-                <a:rPr lang="zh-CN" altLang="en-US" sz="800" dirty="0"/>
+                <a:rPr lang="zh-CN" altLang="en-US" sz="1100" dirty="0"/>
                 <a:t> </a:t>
               </a:r>
               <a:r>
-                <a:rPr lang="en-US" altLang="zh-CN" sz="800" dirty="0"/>
+                <a:rPr lang="en-US" altLang="zh-CN" sz="1100" dirty="0"/>
                 <a:t>document</a:t>
               </a:r>
               <a:r>
-                <a:rPr lang="zh-CN" altLang="en-US" sz="800" dirty="0"/>
+                <a:rPr lang="zh-CN" altLang="en-US" sz="1100" dirty="0"/>
                 <a:t> </a:t>
               </a:r>
               <a:r>
-                <a:rPr lang="en-US" altLang="zh-CN" sz="800" dirty="0"/>
+                <a:rPr lang="en-US" altLang="zh-CN" sz="1100" dirty="0"/>
                 <a:t>page</a:t>
               </a:r>
               <a:r>
-                <a:rPr lang="zh-CN" altLang="en-US" sz="800" dirty="0"/>
+                <a:rPr lang="zh-CN" altLang="en-US" sz="1100" dirty="0"/>
                 <a:t> </a:t>
               </a:r>
               <a:r>
-                <a:rPr lang="en-US" altLang="zh-CN" sz="800" dirty="0"/>
+                <a:rPr lang="en-US" altLang="zh-CN" sz="1100" dirty="0"/>
                 <a:t>or</a:t>
               </a:r>
               <a:r>
-                <a:rPr lang="zh-CN" altLang="en-US" sz="800" dirty="0"/>
+                <a:rPr lang="zh-CN" altLang="en-US" sz="1100" dirty="0"/>
                 <a:t> </a:t>
               </a:r>
               <a:r>
-                <a:rPr lang="en-US" altLang="zh-CN" sz="800" dirty="0"/>
+                <a:rPr lang="en-US" altLang="zh-CN" sz="1100" dirty="0"/>
                 <a:t>interactive</a:t>
               </a:r>
               <a:r>
-                <a:rPr lang="zh-CN" altLang="en-US" sz="800" dirty="0"/>
+                <a:rPr lang="zh-CN" altLang="en-US" sz="1100" dirty="0"/>
                 <a:t> </a:t>
               </a:r>
               <a:r>
-                <a:rPr lang="en-US" altLang="zh-CN" sz="800" dirty="0"/>
+                <a:rPr lang="en-US" altLang="zh-CN" sz="1100" dirty="0"/>
                 <a:t>guide.</a:t>
               </a:r>
-              <a:endParaRPr lang="en-GB" altLang="zh-CN" sz="600" dirty="0">
+              <a:endParaRPr lang="en-GB" altLang="zh-CN" sz="1000" dirty="0">
                 <a:solidFill>
                   <a:schemeClr val="bg1">
                     <a:lumMod val="65000"/>
@@ -10487,8 +10516,8 @@
           </p:nvSpPr>
           <p:spPr bwMode="auto">
             <a:xfrm>
-              <a:off x="5942299" y="880115"/>
-              <a:ext cx="645630" cy="153862"/>
+              <a:off x="5682766" y="880115"/>
+              <a:ext cx="905163" cy="215408"/>
             </a:xfrm>
             <a:prstGeom prst="rect">
               <a:avLst/>
@@ -10554,7 +10583,7 @@
             <a:p>
               <a:pPr algn="r"/>
               <a:r>
-                <a:rPr lang="en-US" altLang="zh-CN" sz="1000" dirty="0">
+                <a:rPr lang="en-US" altLang="zh-CN" sz="1400" dirty="0">
                   <a:solidFill>
                     <a:schemeClr val="bg1">
                       <a:lumMod val="65000"/>
@@ -10566,7 +10595,7 @@
                 </a:rPr>
                 <a:t>User Guide</a:t>
               </a:r>
-              <a:endParaRPr lang="zh-CN" altLang="en-US" sz="1000" dirty="0">
+              <a:endParaRPr lang="zh-CN" altLang="en-US" sz="1400" dirty="0">
                 <a:solidFill>
                   <a:schemeClr val="bg1">
                     <a:lumMod val="65000"/>
@@ -11594,6 +11623,13 @@
   <p:transition spd="slow">
     <p:push dir="d"/>
   </p:transition>
+  <p:timing>
+    <p:tnLst>
+      <p:par>
+        <p:cTn id="1" dur="indefinite" restart="never" nodeType="tmRoot"/>
+      </p:par>
+    </p:tnLst>
+  </p:timing>
 </p:sld>
 </file>
 
@@ -12223,6 +12259,13 @@
   <p:transition spd="slow">
     <p:push dir="d"/>
   </p:transition>
+  <p:timing>
+    <p:tnLst>
+      <p:par>
+        <p:cTn id="1" dur="indefinite" restart="never" nodeType="tmRoot"/>
+      </p:par>
+    </p:tnLst>
+  </p:timing>
 </p:sld>
 </file>
 
@@ -13829,7 +13872,7 @@
         <p:spPr bwMode="auto">
           <a:xfrm>
             <a:off x="2591780" y="3177056"/>
-            <a:ext cx="4064705" cy="499110"/>
+            <a:ext cx="4064705" cy="931024"/>
           </a:xfrm>
           <a:prstGeom prst="rect">
             <a:avLst/>
@@ -13972,14 +14015,24 @@
           <a:p>
             <a:pPr algn="ctr"/>
             <a:r>
-              <a:rPr lang="en-US" altLang="zh-CN" sz="2800" b="1" dirty="0">
+              <a:rPr lang="en-US" altLang="zh-CN" sz="2800" b="1" dirty="0" smtClean="0">
                 <a:solidFill>
                   <a:srgbClr val="093B5C"/>
                 </a:solidFill>
                 <a:latin typeface="Century Gothic" panose="020B0502020202020204" pitchFamily="34" charset="0"/>
                 <a:ea typeface="方正兰亭超细黑简体" pitchFamily="2" charset="-122"/>
               </a:rPr>
-              <a:t>SE Cycle Life</a:t>
+              <a:t>Software Engineering </a:t>
+            </a:r>
+            <a:r>
+              <a:rPr lang="en-US" altLang="zh-CN" sz="2800" b="1" dirty="0">
+                <a:solidFill>
+                  <a:srgbClr val="093B5C"/>
+                </a:solidFill>
+                <a:latin typeface="Century Gothic" panose="020B0502020202020204" pitchFamily="34" charset="0"/>
+                <a:ea typeface="方正兰亭超细黑简体" pitchFamily="2" charset="-122"/>
+              </a:rPr>
+              <a:t>Cycle Life</a:t>
             </a:r>
           </a:p>
         </p:txBody>
@@ -14709,8 +14762,8 @@
         </p:blipFill>
         <p:spPr bwMode="auto">
           <a:xfrm>
-            <a:off x="141936" y="604432"/>
-            <a:ext cx="3835241" cy="4272368"/>
+            <a:off x="3764494" y="-129970"/>
+            <a:ext cx="4735341" cy="5275058"/>
           </a:xfrm>
           <a:prstGeom prst="rect">
             <a:avLst/>
@@ -14754,7 +14807,7 @@
         </p:nvSpPr>
         <p:spPr>
           <a:xfrm>
-            <a:off x="4608004" y="2032484"/>
+            <a:off x="755576" y="1991038"/>
             <a:ext cx="3000373" cy="1477328"/>
           </a:xfrm>
           <a:prstGeom prst="rect">
@@ -14769,9 +14822,18 @@
           <a:lstStyle/>
           <a:p>
             <a:r>
+              <a:rPr kumimoji="1" lang="en-US" altLang="zh-CN" dirty="0" smtClean="0"/>
+              <a:t>Four </a:t>
+            </a:r>
+            <a:r>
               <a:rPr kumimoji="1" lang="en-US" altLang="zh-CN" dirty="0"/>
-              <a:t>4 parallel timeline</a:t>
+              <a:t>parallel </a:t>
             </a:r>
+            <a:r>
+              <a:rPr kumimoji="1" lang="en-US" altLang="zh-CN" dirty="0" smtClean="0"/>
+              <a:t>timeline:</a:t>
+            </a:r>
+            <a:endParaRPr kumimoji="1" lang="en-US" altLang="zh-CN" dirty="0"/>
           </a:p>
           <a:p>
             <a:pPr marL="342900" indent="-342900">
@@ -16062,7 +16124,7 @@
         <p:spPr bwMode="auto">
           <a:xfrm>
             <a:off x="3791696" y="2534711"/>
-            <a:ext cx="1513463" cy="266876"/>
+            <a:ext cx="1513463" cy="333946"/>
           </a:xfrm>
           <a:prstGeom prst="rect">
             <a:avLst/>
@@ -16227,7 +16289,7 @@
               <a:buNone/>
             </a:pPr>
             <a:r>
-              <a:rPr lang="en-US" altLang="zh-CN" sz="1200" dirty="0" err="1">
+              <a:rPr lang="en-US" altLang="zh-CN" sz="1600" dirty="0" err="1">
                 <a:solidFill>
                   <a:schemeClr val="bg1"/>
                 </a:solidFill>
@@ -16237,7 +16299,7 @@
               </a:rPr>
               <a:t>Musier</a:t>
             </a:r>
-            <a:endParaRPr lang="en-US" altLang="zh-CN" sz="1200" dirty="0">
+            <a:endParaRPr lang="en-US" altLang="zh-CN" sz="1600" dirty="0">
               <a:solidFill>
                 <a:schemeClr val="bg1"/>
               </a:solidFill>
@@ -16263,7 +16325,7 @@
         <p:spPr>
           <a:xfrm>
             <a:off x="1169392" y="1495289"/>
-            <a:ext cx="1728162" cy="270461"/>
+            <a:ext cx="1728162" cy="303996"/>
           </a:xfrm>
           <a:prstGeom prst="rect">
             <a:avLst/>
@@ -16282,7 +16344,7 @@
               </a:lnSpc>
             </a:pPr>
             <a:r>
-              <a:rPr lang="en-US" altLang="zh-CN" sz="1200" dirty="0">
+              <a:rPr lang="en-US" altLang="zh-CN" sz="1400" dirty="0">
                 <a:solidFill>
                   <a:schemeClr val="tx1">
                     <a:lumMod val="75000"/>
@@ -16314,7 +16376,7 @@
         <p:spPr>
           <a:xfrm>
             <a:off x="1090014" y="1700384"/>
-            <a:ext cx="1807540" cy="462629"/>
+            <a:ext cx="1807540" cy="594652"/>
           </a:xfrm>
           <a:prstGeom prst="rect">
             <a:avLst/>
@@ -16333,49 +16395,67 @@
               </a:lnSpc>
             </a:pPr>
             <a:r>
-              <a:rPr kumimoji="1" lang="en-US" altLang="zh-CN" sz="900" dirty="0"/>
+              <a:rPr kumimoji="1" lang="en-US" altLang="zh-CN" sz="1200" dirty="0">
+                <a:latin typeface="+mj-lt"/>
+              </a:rPr>
               <a:t>Algorithm</a:t>
             </a:r>
             <a:r>
-              <a:rPr kumimoji="1" lang="zh-CN" altLang="en-US" sz="900" dirty="0"/>
+              <a:rPr kumimoji="1" lang="zh-CN" altLang="en-US" sz="1200" dirty="0">
+                <a:latin typeface="+mj-lt"/>
+              </a:rPr>
               <a:t> </a:t>
             </a:r>
             <a:r>
-              <a:rPr kumimoji="1" lang="en-US" altLang="zh-CN" sz="900" dirty="0"/>
+              <a:rPr kumimoji="1" lang="en-US" altLang="zh-CN" sz="1200" dirty="0">
+                <a:latin typeface="+mj-lt"/>
+              </a:rPr>
               <a:t>design</a:t>
             </a:r>
             <a:r>
-              <a:rPr kumimoji="1" lang="zh-CN" altLang="en-US" sz="900" dirty="0"/>
+              <a:rPr kumimoji="1" lang="zh-CN" altLang="en-US" sz="1200" dirty="0">
+                <a:latin typeface="+mj-lt"/>
+              </a:rPr>
               <a:t> </a:t>
             </a:r>
             <a:r>
-              <a:rPr kumimoji="1" lang="en-US" altLang="zh-CN" sz="900" dirty="0"/>
+              <a:rPr kumimoji="1" lang="en-US" altLang="zh-CN" sz="1200" dirty="0">
+                <a:latin typeface="+mj-lt"/>
+              </a:rPr>
               <a:t>and</a:t>
             </a:r>
             <a:r>
-              <a:rPr kumimoji="1" lang="zh-CN" altLang="en-US" sz="900" dirty="0"/>
+              <a:rPr kumimoji="1" lang="zh-CN" altLang="en-US" sz="1200" dirty="0">
+                <a:latin typeface="+mj-lt"/>
+              </a:rPr>
               <a:t> </a:t>
             </a:r>
             <a:r>
-              <a:rPr kumimoji="1" lang="en-US" altLang="zh-CN" sz="900" dirty="0"/>
+              <a:rPr kumimoji="1" lang="en-US" altLang="zh-CN" sz="1200" dirty="0">
+                <a:latin typeface="+mj-lt"/>
+              </a:rPr>
               <a:t>Backend</a:t>
             </a:r>
             <a:r>
-              <a:rPr kumimoji="1" lang="zh-CN" altLang="en-US" sz="900" dirty="0"/>
+              <a:rPr kumimoji="1" lang="zh-CN" altLang="en-US" sz="1200" dirty="0">
+                <a:latin typeface="+mj-lt"/>
+              </a:rPr>
               <a:t> </a:t>
             </a:r>
             <a:r>
-              <a:rPr kumimoji="1" lang="en-US" altLang="zh-CN" sz="900" dirty="0"/>
+              <a:rPr kumimoji="1" lang="en-US" altLang="zh-CN" sz="1200" dirty="0">
+                <a:latin typeface="+mj-lt"/>
+              </a:rPr>
               <a:t>development</a:t>
             </a:r>
-            <a:endParaRPr lang="en-GB" altLang="zh-CN" sz="900" dirty="0">
+            <a:endParaRPr lang="en-GB" altLang="zh-CN" sz="1200" dirty="0">
               <a:solidFill>
                 <a:schemeClr val="tx1">
                   <a:lumMod val="50000"/>
                   <a:lumOff val="50000"/>
                 </a:schemeClr>
               </a:solidFill>
-              <a:latin typeface="微软雅黑" panose="020B0503020204020204" pitchFamily="34" charset="-122"/>
+              <a:latin typeface="+mj-lt"/>
               <a:ea typeface="微软雅黑" panose="020B0503020204020204" pitchFamily="34" charset="-122"/>
               <a:cs typeface="+mn-ea"/>
               <a:sym typeface="+mn-lt"/>
@@ -16398,7 +16478,7 @@
         <p:spPr>
           <a:xfrm>
             <a:off x="1169392" y="2701817"/>
-            <a:ext cx="1728162" cy="270461"/>
+            <a:ext cx="1728162" cy="303996"/>
           </a:xfrm>
           <a:prstGeom prst="rect">
             <a:avLst/>
@@ -16417,7 +16497,7 @@
               </a:lnSpc>
             </a:pPr>
             <a:r>
-              <a:rPr lang="en-US" altLang="zh-CN" sz="1200" dirty="0">
+              <a:rPr lang="en-US" altLang="zh-CN" sz="1400" dirty="0">
                 <a:solidFill>
                   <a:schemeClr val="tx1">
                     <a:lumMod val="75000"/>
@@ -16432,7 +16512,7 @@
               <a:t>Zhang </a:t>
             </a:r>
             <a:r>
-              <a:rPr lang="en-US" altLang="zh-CN" sz="1200" dirty="0" err="1">
+              <a:rPr lang="en-US" altLang="zh-CN" sz="1400" dirty="0" err="1">
                 <a:solidFill>
                   <a:schemeClr val="tx1">
                     <a:lumMod val="75000"/>
@@ -16446,7 +16526,7 @@
               </a:rPr>
               <a:t>Ruoqing</a:t>
             </a:r>
-            <a:endParaRPr lang="en-US" altLang="zh-CN" sz="1200" dirty="0">
+            <a:endParaRPr lang="en-US" altLang="zh-CN" sz="1400" dirty="0">
               <a:solidFill>
                 <a:schemeClr val="tx1">
                   <a:lumMod val="75000"/>
@@ -16476,7 +16556,7 @@
         <p:spPr>
           <a:xfrm>
             <a:off x="1090014" y="2906913"/>
-            <a:ext cx="1807540" cy="254880"/>
+            <a:ext cx="1807540" cy="316755"/>
           </a:xfrm>
           <a:prstGeom prst="rect">
             <a:avLst/>
@@ -16495,42 +16575,42 @@
               </a:lnSpc>
             </a:pPr>
             <a:r>
-              <a:rPr kumimoji="1" lang="en-US" altLang="zh-CN" sz="900" dirty="0"/>
+              <a:rPr kumimoji="1" lang="en-US" altLang="zh-CN" sz="1200" dirty="0"/>
               <a:t>UI</a:t>
             </a:r>
             <a:r>
-              <a:rPr kumimoji="1" lang="zh-CN" altLang="en-US" sz="900" dirty="0"/>
+              <a:rPr kumimoji="1" lang="zh-CN" altLang="en-US" sz="1200" dirty="0"/>
               <a:t> </a:t>
             </a:r>
             <a:r>
-              <a:rPr kumimoji="1" lang="en-US" altLang="zh-CN" sz="900" dirty="0"/>
+              <a:rPr kumimoji="1" lang="en-US" altLang="zh-CN" sz="1200" dirty="0"/>
               <a:t>design</a:t>
             </a:r>
             <a:r>
-              <a:rPr kumimoji="1" lang="zh-CN" altLang="en-US" sz="900" dirty="0"/>
+              <a:rPr kumimoji="1" lang="zh-CN" altLang="en-US" sz="1200" dirty="0"/>
               <a:t> </a:t>
             </a:r>
             <a:r>
-              <a:rPr kumimoji="1" lang="en-US" altLang="zh-CN" sz="900" dirty="0"/>
+              <a:rPr kumimoji="1" lang="en-US" altLang="zh-CN" sz="1200" dirty="0"/>
               <a:t>and</a:t>
             </a:r>
             <a:r>
-              <a:rPr kumimoji="1" lang="zh-CN" altLang="en-US" sz="900" dirty="0"/>
+              <a:rPr kumimoji="1" lang="zh-CN" altLang="en-US" sz="1200" dirty="0"/>
               <a:t> </a:t>
             </a:r>
             <a:r>
-              <a:rPr kumimoji="1" lang="en-US" altLang="zh-CN" sz="900" dirty="0"/>
+              <a:rPr kumimoji="1" lang="en-US" altLang="zh-CN" sz="1200" dirty="0"/>
               <a:t>art</a:t>
             </a:r>
             <a:r>
-              <a:rPr kumimoji="1" lang="zh-CN" altLang="en-US" sz="900" dirty="0"/>
+              <a:rPr kumimoji="1" lang="zh-CN" altLang="en-US" sz="1200" dirty="0"/>
               <a:t> </a:t>
             </a:r>
             <a:r>
-              <a:rPr kumimoji="1" lang="en-US" altLang="zh-CN" sz="900" dirty="0"/>
+              <a:rPr kumimoji="1" lang="en-US" altLang="zh-CN" sz="1200" dirty="0"/>
               <a:t>design</a:t>
             </a:r>
-            <a:endParaRPr lang="en-GB" altLang="zh-CN" sz="900" dirty="0">
+            <a:endParaRPr lang="en-GB" altLang="zh-CN" sz="1200" dirty="0">
               <a:solidFill>
                 <a:schemeClr val="tx1">
                   <a:lumMod val="50000"/>
@@ -16560,7 +16640,7 @@
         <p:spPr>
           <a:xfrm>
             <a:off x="1169392" y="3834906"/>
-            <a:ext cx="1728162" cy="270461"/>
+            <a:ext cx="1728162" cy="303996"/>
           </a:xfrm>
           <a:prstGeom prst="rect">
             <a:avLst/>
@@ -16579,7 +16659,7 @@
               </a:lnSpc>
             </a:pPr>
             <a:r>
-              <a:rPr lang="en-US" altLang="zh-CN" sz="1200" dirty="0">
+              <a:rPr lang="en-US" altLang="zh-CN" sz="1400" dirty="0">
                 <a:solidFill>
                   <a:schemeClr val="tx1">
                     <a:lumMod val="75000"/>
@@ -16594,7 +16674,7 @@
               <a:t>Wang </a:t>
             </a:r>
             <a:r>
-              <a:rPr lang="en-US" altLang="zh-CN" sz="1200" dirty="0" err="1">
+              <a:rPr lang="en-US" altLang="zh-CN" sz="1400" dirty="0" err="1">
                 <a:solidFill>
                   <a:schemeClr val="tx1">
                     <a:lumMod val="75000"/>
@@ -16608,7 +16688,7 @@
               </a:rPr>
               <a:t>Junce</a:t>
             </a:r>
-            <a:endParaRPr lang="en-US" altLang="zh-CN" sz="1200" dirty="0">
+            <a:endParaRPr lang="en-US" altLang="zh-CN" sz="1400" dirty="0">
               <a:solidFill>
                 <a:schemeClr val="tx1">
                   <a:lumMod val="75000"/>
@@ -16637,8 +16717,8 @@
         </p:nvSpPr>
         <p:spPr>
           <a:xfrm>
-            <a:off x="1090014" y="4040001"/>
-            <a:ext cx="1807540" cy="255521"/>
+            <a:off x="755576" y="4040001"/>
+            <a:ext cx="2141978" cy="346251"/>
           </a:xfrm>
           <a:prstGeom prst="rect">
             <a:avLst/>
@@ -16657,7 +16737,7 @@
               </a:lnSpc>
             </a:pPr>
             <a:r>
-              <a:rPr lang="en-US" altLang="zh-CN" sz="900" dirty="0">
+              <a:rPr lang="en-US" altLang="zh-CN" sz="1200" dirty="0">
                 <a:latin typeface="+mj-lt"/>
                 <a:ea typeface="微软雅黑" panose="020B0503020204020204" pitchFamily="34" charset="-122"/>
                 <a:cs typeface="+mn-ea"/>
@@ -16665,7 +16745,7 @@
               </a:rPr>
               <a:t>API design and documentation</a:t>
             </a:r>
-            <a:endParaRPr lang="en-GB" altLang="zh-CN" sz="900" dirty="0">
+            <a:endParaRPr lang="en-GB" altLang="zh-CN" sz="1200" dirty="0">
               <a:latin typeface="+mj-lt"/>
               <a:ea typeface="微软雅黑" panose="020B0503020204020204" pitchFamily="34" charset="-122"/>
               <a:cs typeface="+mn-ea"/>
@@ -16689,7 +16769,7 @@
         <p:spPr>
           <a:xfrm>
             <a:off x="6215535" y="2701817"/>
-            <a:ext cx="1728162" cy="270461"/>
+            <a:ext cx="1728162" cy="303996"/>
           </a:xfrm>
           <a:prstGeom prst="rect">
             <a:avLst/>
@@ -16708,7 +16788,7 @@
               </a:lnSpc>
             </a:pPr>
             <a:r>
-              <a:rPr lang="en-US" altLang="zh-CN" sz="1200" dirty="0">
+              <a:rPr lang="en-US" altLang="zh-CN" sz="1400" dirty="0">
                 <a:solidFill>
                   <a:schemeClr val="tx1">
                     <a:lumMod val="75000"/>
@@ -16723,7 +16803,7 @@
               <a:t>Ye </a:t>
             </a:r>
             <a:r>
-              <a:rPr lang="en-US" altLang="zh-CN" sz="1200" dirty="0" err="1">
+              <a:rPr lang="en-US" altLang="zh-CN" sz="1400" dirty="0" err="1">
                 <a:solidFill>
                   <a:schemeClr val="tx1">
                     <a:lumMod val="75000"/>
@@ -16737,7 +16817,7 @@
               </a:rPr>
               <a:t>Shuqian</a:t>
             </a:r>
-            <a:endParaRPr lang="en-US" altLang="zh-CN" sz="1200" dirty="0">
+            <a:endParaRPr lang="en-US" altLang="zh-CN" sz="1400" dirty="0">
               <a:solidFill>
                 <a:schemeClr val="tx1">
                   <a:lumMod val="75000"/>
@@ -16767,7 +16847,7 @@
         <p:spPr>
           <a:xfrm>
             <a:off x="6215535" y="2906913"/>
-            <a:ext cx="1838454" cy="460256"/>
+            <a:ext cx="1838454" cy="594652"/>
           </a:xfrm>
           <a:prstGeom prst="rect">
             <a:avLst/>
@@ -16786,7 +16866,7 @@
               </a:lnSpc>
             </a:pPr>
             <a:r>
-              <a:rPr lang="en-US" altLang="zh-CN" sz="900" dirty="0">
+              <a:rPr lang="en-US" altLang="zh-CN" sz="1200" dirty="0">
                 <a:latin typeface="+mj-lt"/>
                 <a:ea typeface="微软雅黑" panose="020B0503020204020204" pitchFamily="34" charset="-122"/>
                 <a:cs typeface="+mn-ea"/>
@@ -16794,7 +16874,7 @@
               </a:rPr>
               <a:t>Product manager and documentation</a:t>
             </a:r>
-            <a:endParaRPr lang="en-GB" altLang="zh-CN" sz="900" dirty="0">
+            <a:endParaRPr lang="en-GB" altLang="zh-CN" sz="1200" dirty="0">
               <a:latin typeface="+mj-lt"/>
               <a:ea typeface="微软雅黑" panose="020B0503020204020204" pitchFamily="34" charset="-122"/>
               <a:cs typeface="+mn-ea"/>
@@ -16818,7 +16898,7 @@
         <p:spPr>
           <a:xfrm>
             <a:off x="6079193" y="1495289"/>
-            <a:ext cx="1728162" cy="270461"/>
+            <a:ext cx="1728162" cy="303996"/>
           </a:xfrm>
           <a:prstGeom prst="rect">
             <a:avLst/>
@@ -16837,7 +16917,7 @@
               </a:lnSpc>
             </a:pPr>
             <a:r>
-              <a:rPr lang="en-US" altLang="zh-CN" sz="1200" dirty="0">
+              <a:rPr lang="en-US" altLang="zh-CN" sz="1400" dirty="0">
                 <a:solidFill>
                   <a:schemeClr val="tx1">
                     <a:lumMod val="75000"/>
@@ -16852,7 +16932,7 @@
               <a:t>Li </a:t>
             </a:r>
             <a:r>
-              <a:rPr lang="en-US" altLang="zh-CN" sz="1200" dirty="0" err="1">
+              <a:rPr lang="en-US" altLang="zh-CN" sz="1400" dirty="0" err="1">
                 <a:solidFill>
                   <a:schemeClr val="tx1">
                     <a:lumMod val="75000"/>
@@ -16866,7 +16946,7 @@
               </a:rPr>
               <a:t>Kengjie</a:t>
             </a:r>
-            <a:endParaRPr lang="en-US" altLang="zh-CN" sz="1200" dirty="0">
+            <a:endParaRPr lang="en-US" altLang="zh-CN" sz="1400" dirty="0">
               <a:solidFill>
                 <a:schemeClr val="tx1">
                   <a:lumMod val="75000"/>
@@ -16896,7 +16976,7 @@
         <p:spPr>
           <a:xfrm>
             <a:off x="6079195" y="1700384"/>
-            <a:ext cx="1838454" cy="462629"/>
+            <a:ext cx="1838454" cy="593754"/>
           </a:xfrm>
           <a:prstGeom prst="rect">
             <a:avLst/>
@@ -16915,18 +16995,18 @@
               </a:lnSpc>
             </a:pPr>
             <a:r>
-              <a:rPr kumimoji="1" lang="en-US" altLang="zh-CN" sz="900" dirty="0"/>
+              <a:rPr kumimoji="1" lang="en-US" altLang="zh-CN" sz="1200" dirty="0"/>
               <a:t>Frontend</a:t>
             </a:r>
             <a:r>
-              <a:rPr kumimoji="1" lang="zh-CN" altLang="en-US" sz="900" dirty="0"/>
+              <a:rPr kumimoji="1" lang="zh-CN" altLang="en-US" sz="1200" dirty="0"/>
               <a:t> </a:t>
             </a:r>
             <a:r>
-              <a:rPr kumimoji="1" lang="en-US" altLang="zh-CN" sz="900" dirty="0"/>
+              <a:rPr kumimoji="1" lang="en-US" altLang="zh-CN" sz="1200" dirty="0"/>
               <a:t>development and documentation</a:t>
             </a:r>
-            <a:endParaRPr lang="en-GB" altLang="zh-CN" sz="900" dirty="0">
+            <a:endParaRPr lang="en-GB" altLang="zh-CN" sz="1200" dirty="0">
               <a:solidFill>
                 <a:schemeClr val="tx1">
                   <a:lumMod val="50000"/>

</xml_diff>

<commit_message>
Fix bug about chord generator with DP and dict
</commit_message>
<xml_diff>
--- a/Pre-Final Pre/MusierPreFinal.pptx
+++ b/Pre-Final Pre/MusierPreFinal.pptx
@@ -6604,15 +6604,15 @@
                 <a:t> </a:t>
               </a:r>
               <a:r>
-                <a:rPr kumimoji="1" lang="en-US" altLang="zh-CN" sz="1200" dirty="0" err="1" smtClean="0"/>
+                <a:rPr kumimoji="1" lang="en-US" altLang="zh-CN" sz="1200" dirty="0" err="1"/>
                 <a:t>abc</a:t>
               </a:r>
               <a:r>
-                <a:rPr kumimoji="1" lang="en-US" altLang="zh-CN" sz="1200" dirty="0" smtClean="0"/>
+                <a:rPr kumimoji="1" lang="en-US" altLang="zh-CN" sz="1200" dirty="0"/>
                 <a:t> notion</a:t>
               </a:r>
               <a:r>
-                <a:rPr kumimoji="1" lang="zh-CN" altLang="en-US" sz="1200" dirty="0" smtClean="0"/>
+                <a:rPr kumimoji="1" lang="zh-CN" altLang="en-US" sz="1200" dirty="0"/>
                 <a:t> </a:t>
               </a:r>
               <a:r>
@@ -6826,7 +6826,7 @@
                 <a:t>genetic algorithm</a:t>
               </a:r>
               <a:r>
-                <a:rPr kumimoji="1" lang="zh-CN" altLang="en-US" sz="1200" dirty="0" smtClean="0"/>
+                <a:rPr kumimoji="1" lang="zh-CN" altLang="en-US" sz="1200" dirty="0"/>
                 <a:t> </a:t>
               </a:r>
               <a:r>
@@ -7637,7 +7637,7 @@
               </a:r>
               <a:r>
                 <a:rPr kumimoji="1" lang="en-US" altLang="zh-CN" sz="1200" dirty="0"/>
-                <a:t>dynamic</a:t>
+                <a:t>pre-defined dictionary is</a:t>
               </a:r>
               <a:r>
                 <a:rPr kumimoji="1" lang="zh-CN" altLang="en-US" sz="1200" dirty="0"/>
@@ -7645,23 +7645,7 @@
               </a:r>
               <a:r>
                 <a:rPr kumimoji="1" lang="en-US" altLang="zh-CN" sz="1200" dirty="0"/>
-                <a:t>programming</a:t>
-              </a:r>
-              <a:r>
-                <a:rPr kumimoji="1" lang="zh-CN" altLang="en-US" sz="1200" dirty="0"/>
-                <a:t> </a:t>
-              </a:r>
-              <a:r>
-                <a:rPr kumimoji="1" lang="en-US" altLang="zh-CN" sz="1200" dirty="0"/>
-                <a:t>is</a:t>
-              </a:r>
-              <a:r>
-                <a:rPr kumimoji="1" lang="zh-CN" altLang="en-US" sz="1200" dirty="0"/>
-                <a:t> </a:t>
-              </a:r>
-              <a:r>
-                <a:rPr kumimoji="1" lang="en-US" altLang="zh-CN" sz="1200" dirty="0"/>
-                <a:t>applied</a:t>
+                <a:t>referenced</a:t>
               </a:r>
               <a:r>
                 <a:rPr kumimoji="1" lang="zh-CN" altLang="en-US" sz="1200" dirty="0"/>
@@ -9231,13 +9215,6 @@
   <p:transition spd="slow">
     <p:push dir="d"/>
   </p:transition>
-  <p:timing>
-    <p:tnLst>
-      <p:par>
-        <p:cTn id="1" dur="indefinite" restart="never" nodeType="tmRoot"/>
-      </p:par>
-    </p:tnLst>
-  </p:timing>
 </p:sld>
 </file>
 
@@ -9696,9 +9673,9 @@
         <p:grpSpPr bwMode="auto">
           <a:xfrm>
             <a:off x="539552" y="1483854"/>
-            <a:ext cx="2967296" cy="1329191"/>
+            <a:ext cx="2967296" cy="1853373"/>
             <a:chOff x="3622384" y="880115"/>
-            <a:chExt cx="2965545" cy="1328969"/>
+            <a:chExt cx="2965545" cy="1853064"/>
           </a:xfrm>
         </p:grpSpPr>
         <p:sp>
@@ -9712,7 +9689,7 @@
           <p:spPr bwMode="auto">
             <a:xfrm>
               <a:off x="3622384" y="1101273"/>
-              <a:ext cx="2965545" cy="1107811"/>
+              <a:ext cx="2965545" cy="1631906"/>
             </a:xfrm>
             <a:prstGeom prst="rect">
               <a:avLst/>
@@ -9860,7 +9837,7 @@
               </a:pPr>
               <a:r>
                 <a:rPr lang="en-US" altLang="zh-CN" sz="1200" dirty="0"/>
-                <a:t>Let</a:t>
+                <a:t>Change the chord generator to a dynamic programming algorithm.  Let</a:t>
               </a:r>
               <a:r>
                 <a:rPr lang="zh-CN" altLang="en-US" sz="1200" dirty="0"/>
@@ -10110,8 +10087,8 @@
           </p:nvSpPr>
           <p:spPr bwMode="auto">
             <a:xfrm>
-              <a:off x="5554602" y="880115"/>
-              <a:ext cx="1033327" cy="215408"/>
+              <a:off x="4680134" y="880115"/>
+              <a:ext cx="1907795" cy="215408"/>
             </a:xfrm>
             <a:prstGeom prst="rect">
               <a:avLst/>
@@ -10187,7 +10164,7 @@
                   <a:ea typeface="微软雅黑" panose="020B0503020204020204" pitchFamily="34" charset="-122"/>
                   <a:sym typeface="Arial" panose="020B0604020202020204" pitchFamily="34" charset="0"/>
                 </a:rPr>
-                <a:t>Arrangement</a:t>
+                <a:t>Chord and Arrangement</a:t>
               </a:r>
               <a:endParaRPr lang="zh-CN" altLang="en-US" sz="1400" dirty="0">
                 <a:solidFill>
@@ -10214,9 +10191,9 @@
         <p:grpSpPr bwMode="auto">
           <a:xfrm>
             <a:off x="647563" y="3423869"/>
-            <a:ext cx="2859284" cy="775681"/>
+            <a:ext cx="2859284" cy="748365"/>
             <a:chOff x="3730332" y="880115"/>
-            <a:chExt cx="2857597" cy="775551"/>
+            <a:chExt cx="2857597" cy="748240"/>
           </a:xfrm>
         </p:grpSpPr>
         <p:sp>
@@ -10230,7 +10207,7 @@
           <p:spPr bwMode="auto">
             <a:xfrm>
               <a:off x="3730332" y="1147920"/>
-              <a:ext cx="2857597" cy="507746"/>
+              <a:ext cx="2857597" cy="480435"/>
             </a:xfrm>
             <a:prstGeom prst="rect">
               <a:avLst/>
@@ -10409,12 +10386,8 @@
                 <a:t> </a:t>
               </a:r>
               <a:r>
-                <a:rPr lang="en-US" altLang="zh-CN" sz="1100" dirty="0" err="1" smtClean="0"/>
-                <a:t>abc</a:t>
-              </a:r>
-              <a:r>
-                <a:rPr lang="en-US" altLang="zh-CN" sz="1100" dirty="0" smtClean="0"/>
-                <a:t> notion</a:t>
+                <a:rPr lang="en-US" altLang="zh-CN" sz="1100" dirty="0" err="1"/>
+                <a:t>abcnotion</a:t>
               </a:r>
               <a:r>
                 <a:rPr lang="en-US" altLang="zh-CN" sz="1100" dirty="0"/>
@@ -11623,13 +11596,6 @@
   <p:transition spd="slow">
     <p:push dir="d"/>
   </p:transition>
-  <p:timing>
-    <p:tnLst>
-      <p:par>
-        <p:cTn id="1" dur="indefinite" restart="never" nodeType="tmRoot"/>
-      </p:par>
-    </p:tnLst>
-  </p:timing>
 </p:sld>
 </file>
 
@@ -12259,13 +12225,6 @@
   <p:transition spd="slow">
     <p:push dir="d"/>
   </p:transition>
-  <p:timing>
-    <p:tnLst>
-      <p:par>
-        <p:cTn id="1" dur="indefinite" restart="never" nodeType="tmRoot"/>
-      </p:par>
-    </p:tnLst>
-  </p:timing>
 </p:sld>
 </file>
 
@@ -14015,24 +13974,14 @@
           <a:p>
             <a:pPr algn="ctr"/>
             <a:r>
-              <a:rPr lang="en-US" altLang="zh-CN" sz="2800" b="1" dirty="0" smtClean="0">
+              <a:rPr lang="en-US" altLang="zh-CN" sz="2800" b="1" dirty="0">
                 <a:solidFill>
                   <a:srgbClr val="093B5C"/>
                 </a:solidFill>
                 <a:latin typeface="Century Gothic" panose="020B0502020202020204" pitchFamily="34" charset="0"/>
                 <a:ea typeface="方正兰亭超细黑简体" pitchFamily="2" charset="-122"/>
               </a:rPr>
-              <a:t>Software Engineering </a:t>
-            </a:r>
-            <a:r>
-              <a:rPr lang="en-US" altLang="zh-CN" sz="2800" b="1" dirty="0">
-                <a:solidFill>
-                  <a:srgbClr val="093B5C"/>
-                </a:solidFill>
-                <a:latin typeface="Century Gothic" panose="020B0502020202020204" pitchFamily="34" charset="0"/>
-                <a:ea typeface="方正兰亭超细黑简体" pitchFamily="2" charset="-122"/>
-              </a:rPr>
-              <a:t>Cycle Life</a:t>
+              <a:t>Software Engineering Cycle Life</a:t>
             </a:r>
           </a:p>
         </p:txBody>
@@ -14822,18 +14771,9 @@
           <a:lstStyle/>
           <a:p>
             <a:r>
-              <a:rPr kumimoji="1" lang="en-US" altLang="zh-CN" dirty="0" smtClean="0"/>
-              <a:t>Four </a:t>
+              <a:rPr kumimoji="1" lang="en-US" altLang="zh-CN" dirty="0"/>
+              <a:t>Four parallel timeline:</a:t>
             </a:r>
-            <a:r>
-              <a:rPr kumimoji="1" lang="en-US" altLang="zh-CN" dirty="0"/>
-              <a:t>parallel </a:t>
-            </a:r>
-            <a:r>
-              <a:rPr kumimoji="1" lang="en-US" altLang="zh-CN" dirty="0" smtClean="0"/>
-              <a:t>timeline:</a:t>
-            </a:r>
-            <a:endParaRPr kumimoji="1" lang="en-US" altLang="zh-CN" dirty="0"/>
           </a:p>
           <a:p>
             <a:pPr marL="342900" indent="-342900">

</xml_diff>